<commit_message>
[#773] Developer Guide: tweak undo/redo diagrams (#774)
Some diagrams in the the explanation of the undo/redo feature take more
space than they need. This is especially a problem because that segment
is included in the sample Project Portfolio Page which has a page limit.

Let's tweak the relevant diagrams to be more space efficient.
</commit_message>
<xml_diff>
--- a/docs/diagrams/UndoRedoActivityDiagram.pptx
+++ b/docs/diagrams/UndoRedoActivityDiagram.pptx
@@ -138,7 +138,7 @@
           <p:cNvPr id="2" name="Title 1">
             <a:extLst>
               <a:ext uri="{FF2B5EF4-FFF2-40B4-BE49-F238E27FC236}">
-                <a16:creationId xmlns:a16="http://schemas.microsoft.com/office/drawing/2014/main" id="{CE1B3102-23FE-4A07-92CF-8DB8025B5C54}"/>
+                <a16:creationId xmlns:a16="http://schemas.microsoft.com/office/drawing/2014/main" xmlns="" id="{CE1B3102-23FE-4A07-92CF-8DB8025B5C54}"/>
               </a:ext>
             </a:extLst>
           </p:cNvPr>
@@ -176,7 +176,7 @@
           <p:cNvPr id="3" name="Subtitle 2">
             <a:extLst>
               <a:ext uri="{FF2B5EF4-FFF2-40B4-BE49-F238E27FC236}">
-                <a16:creationId xmlns:a16="http://schemas.microsoft.com/office/drawing/2014/main" id="{09A64644-374F-4763-B477-E75EED09E18A}"/>
+                <a16:creationId xmlns:a16="http://schemas.microsoft.com/office/drawing/2014/main" xmlns="" id="{09A64644-374F-4763-B477-E75EED09E18A}"/>
               </a:ext>
             </a:extLst>
           </p:cNvPr>
@@ -247,7 +247,7 @@
           <p:cNvPr id="4" name="Date Placeholder 3">
             <a:extLst>
               <a:ext uri="{FF2B5EF4-FFF2-40B4-BE49-F238E27FC236}">
-                <a16:creationId xmlns:a16="http://schemas.microsoft.com/office/drawing/2014/main" id="{26CAD04B-553E-4EE0-8FEC-DA9E05F22F2C}"/>
+                <a16:creationId xmlns:a16="http://schemas.microsoft.com/office/drawing/2014/main" xmlns="" id="{26CAD04B-553E-4EE0-8FEC-DA9E05F22F2C}"/>
               </a:ext>
             </a:extLst>
           </p:cNvPr>
@@ -265,7 +265,7 @@
           <a:p>
             <a:fld id="{542F47FF-5056-41FF-A1F8-23A414798AA4}" type="datetimeFigureOut">
               <a:rPr lang="en-SG" smtClean="0"/>
-              <a:t>29/7/2017</a:t>
+              <a:t>30/12/2017</a:t>
             </a:fld>
             <a:endParaRPr lang="en-SG"/>
           </a:p>
@@ -276,7 +276,7 @@
           <p:cNvPr id="5" name="Footer Placeholder 4">
             <a:extLst>
               <a:ext uri="{FF2B5EF4-FFF2-40B4-BE49-F238E27FC236}">
-                <a16:creationId xmlns:a16="http://schemas.microsoft.com/office/drawing/2014/main" id="{E6F42670-2AD7-448C-BB6C-D759C9255DEB}"/>
+                <a16:creationId xmlns:a16="http://schemas.microsoft.com/office/drawing/2014/main" xmlns="" id="{E6F42670-2AD7-448C-BB6C-D759C9255DEB}"/>
               </a:ext>
             </a:extLst>
           </p:cNvPr>
@@ -301,7 +301,7 @@
           <p:cNvPr id="6" name="Slide Number Placeholder 5">
             <a:extLst>
               <a:ext uri="{FF2B5EF4-FFF2-40B4-BE49-F238E27FC236}">
-                <a16:creationId xmlns:a16="http://schemas.microsoft.com/office/drawing/2014/main" id="{8CFAA546-9089-42A6-8CCB-5E88855E6CB1}"/>
+                <a16:creationId xmlns:a16="http://schemas.microsoft.com/office/drawing/2014/main" xmlns="" id="{8CFAA546-9089-42A6-8CCB-5E88855E6CB1}"/>
               </a:ext>
             </a:extLst>
           </p:cNvPr>
@@ -360,7 +360,7 @@
           <p:cNvPr id="2" name="Title 1">
             <a:extLst>
               <a:ext uri="{FF2B5EF4-FFF2-40B4-BE49-F238E27FC236}">
-                <a16:creationId xmlns:a16="http://schemas.microsoft.com/office/drawing/2014/main" id="{C73C8897-08BA-4903-B8F2-48E6E6713059}"/>
+                <a16:creationId xmlns:a16="http://schemas.microsoft.com/office/drawing/2014/main" xmlns="" id="{C73C8897-08BA-4903-B8F2-48E6E6713059}"/>
               </a:ext>
             </a:extLst>
           </p:cNvPr>
@@ -389,7 +389,7 @@
           <p:cNvPr id="3" name="Vertical Text Placeholder 2">
             <a:extLst>
               <a:ext uri="{FF2B5EF4-FFF2-40B4-BE49-F238E27FC236}">
-                <a16:creationId xmlns:a16="http://schemas.microsoft.com/office/drawing/2014/main" id="{F4DB86F3-F3A8-4AC4-A2D0-18858F9E9EAF}"/>
+                <a16:creationId xmlns:a16="http://schemas.microsoft.com/office/drawing/2014/main" xmlns="" id="{F4DB86F3-F3A8-4AC4-A2D0-18858F9E9EAF}"/>
               </a:ext>
             </a:extLst>
           </p:cNvPr>
@@ -447,7 +447,7 @@
           <p:cNvPr id="4" name="Date Placeholder 3">
             <a:extLst>
               <a:ext uri="{FF2B5EF4-FFF2-40B4-BE49-F238E27FC236}">
-                <a16:creationId xmlns:a16="http://schemas.microsoft.com/office/drawing/2014/main" id="{22C4FC92-3E88-48DC-9327-19CD6A48E96D}"/>
+                <a16:creationId xmlns:a16="http://schemas.microsoft.com/office/drawing/2014/main" xmlns="" id="{22C4FC92-3E88-48DC-9327-19CD6A48E96D}"/>
               </a:ext>
             </a:extLst>
           </p:cNvPr>
@@ -465,7 +465,7 @@
           <a:p>
             <a:fld id="{542F47FF-5056-41FF-A1F8-23A414798AA4}" type="datetimeFigureOut">
               <a:rPr lang="en-SG" smtClean="0"/>
-              <a:t>29/7/2017</a:t>
+              <a:t>30/12/2017</a:t>
             </a:fld>
             <a:endParaRPr lang="en-SG"/>
           </a:p>
@@ -476,7 +476,7 @@
           <p:cNvPr id="5" name="Footer Placeholder 4">
             <a:extLst>
               <a:ext uri="{FF2B5EF4-FFF2-40B4-BE49-F238E27FC236}">
-                <a16:creationId xmlns:a16="http://schemas.microsoft.com/office/drawing/2014/main" id="{AA190F3C-D185-4E17-A1B5-D7F4DF331BE0}"/>
+                <a16:creationId xmlns:a16="http://schemas.microsoft.com/office/drawing/2014/main" xmlns="" id="{AA190F3C-D185-4E17-A1B5-D7F4DF331BE0}"/>
               </a:ext>
             </a:extLst>
           </p:cNvPr>
@@ -501,7 +501,7 @@
           <p:cNvPr id="6" name="Slide Number Placeholder 5">
             <a:extLst>
               <a:ext uri="{FF2B5EF4-FFF2-40B4-BE49-F238E27FC236}">
-                <a16:creationId xmlns:a16="http://schemas.microsoft.com/office/drawing/2014/main" id="{0F2506F5-483C-4F84-8363-1D309E459ADD}"/>
+                <a16:creationId xmlns:a16="http://schemas.microsoft.com/office/drawing/2014/main" xmlns="" id="{0F2506F5-483C-4F84-8363-1D309E459ADD}"/>
               </a:ext>
             </a:extLst>
           </p:cNvPr>
@@ -560,7 +560,7 @@
           <p:cNvPr id="2" name="Vertical Title 1">
             <a:extLst>
               <a:ext uri="{FF2B5EF4-FFF2-40B4-BE49-F238E27FC236}">
-                <a16:creationId xmlns:a16="http://schemas.microsoft.com/office/drawing/2014/main" id="{967C03EB-4647-4E98-B84F-7651E807A990}"/>
+                <a16:creationId xmlns:a16="http://schemas.microsoft.com/office/drawing/2014/main" xmlns="" id="{967C03EB-4647-4E98-B84F-7651E807A990}"/>
               </a:ext>
             </a:extLst>
           </p:cNvPr>
@@ -594,7 +594,7 @@
           <p:cNvPr id="3" name="Vertical Text Placeholder 2">
             <a:extLst>
               <a:ext uri="{FF2B5EF4-FFF2-40B4-BE49-F238E27FC236}">
-                <a16:creationId xmlns:a16="http://schemas.microsoft.com/office/drawing/2014/main" id="{22B1D2A8-918A-4854-959C-EDA5D46D2D74}"/>
+                <a16:creationId xmlns:a16="http://schemas.microsoft.com/office/drawing/2014/main" xmlns="" id="{22B1D2A8-918A-4854-959C-EDA5D46D2D74}"/>
               </a:ext>
             </a:extLst>
           </p:cNvPr>
@@ -657,7 +657,7 @@
           <p:cNvPr id="4" name="Date Placeholder 3">
             <a:extLst>
               <a:ext uri="{FF2B5EF4-FFF2-40B4-BE49-F238E27FC236}">
-                <a16:creationId xmlns:a16="http://schemas.microsoft.com/office/drawing/2014/main" id="{3F77D3B6-616A-4D06-980E-5A7866F9BB49}"/>
+                <a16:creationId xmlns:a16="http://schemas.microsoft.com/office/drawing/2014/main" xmlns="" id="{3F77D3B6-616A-4D06-980E-5A7866F9BB49}"/>
               </a:ext>
             </a:extLst>
           </p:cNvPr>
@@ -675,7 +675,7 @@
           <a:p>
             <a:fld id="{542F47FF-5056-41FF-A1F8-23A414798AA4}" type="datetimeFigureOut">
               <a:rPr lang="en-SG" smtClean="0"/>
-              <a:t>29/7/2017</a:t>
+              <a:t>30/12/2017</a:t>
             </a:fld>
             <a:endParaRPr lang="en-SG"/>
           </a:p>
@@ -686,7 +686,7 @@
           <p:cNvPr id="5" name="Footer Placeholder 4">
             <a:extLst>
               <a:ext uri="{FF2B5EF4-FFF2-40B4-BE49-F238E27FC236}">
-                <a16:creationId xmlns:a16="http://schemas.microsoft.com/office/drawing/2014/main" id="{20525AA2-4FD6-4C5E-B28C-2C71AF011737}"/>
+                <a16:creationId xmlns:a16="http://schemas.microsoft.com/office/drawing/2014/main" xmlns="" id="{20525AA2-4FD6-4C5E-B28C-2C71AF011737}"/>
               </a:ext>
             </a:extLst>
           </p:cNvPr>
@@ -711,7 +711,7 @@
           <p:cNvPr id="6" name="Slide Number Placeholder 5">
             <a:extLst>
               <a:ext uri="{FF2B5EF4-FFF2-40B4-BE49-F238E27FC236}">
-                <a16:creationId xmlns:a16="http://schemas.microsoft.com/office/drawing/2014/main" id="{4E040DF9-BA3F-440A-8819-8D374D74F15E}"/>
+                <a16:creationId xmlns:a16="http://schemas.microsoft.com/office/drawing/2014/main" xmlns="" id="{4E040DF9-BA3F-440A-8819-8D374D74F15E}"/>
               </a:ext>
             </a:extLst>
           </p:cNvPr>
@@ -770,7 +770,7 @@
           <p:cNvPr id="2" name="Title 1">
             <a:extLst>
               <a:ext uri="{FF2B5EF4-FFF2-40B4-BE49-F238E27FC236}">
-                <a16:creationId xmlns:a16="http://schemas.microsoft.com/office/drawing/2014/main" id="{75C804EA-614F-485C-A53F-C32B83B67A30}"/>
+                <a16:creationId xmlns:a16="http://schemas.microsoft.com/office/drawing/2014/main" xmlns="" id="{75C804EA-614F-485C-A53F-C32B83B67A30}"/>
               </a:ext>
             </a:extLst>
           </p:cNvPr>
@@ -799,7 +799,7 @@
           <p:cNvPr id="3" name="Content Placeholder 2">
             <a:extLst>
               <a:ext uri="{FF2B5EF4-FFF2-40B4-BE49-F238E27FC236}">
-                <a16:creationId xmlns:a16="http://schemas.microsoft.com/office/drawing/2014/main" id="{912A86A6-5554-4D2F-97BB-2D649E738506}"/>
+                <a16:creationId xmlns:a16="http://schemas.microsoft.com/office/drawing/2014/main" xmlns="" id="{912A86A6-5554-4D2F-97BB-2D649E738506}"/>
               </a:ext>
             </a:extLst>
           </p:cNvPr>
@@ -857,7 +857,7 @@
           <p:cNvPr id="4" name="Date Placeholder 3">
             <a:extLst>
               <a:ext uri="{FF2B5EF4-FFF2-40B4-BE49-F238E27FC236}">
-                <a16:creationId xmlns:a16="http://schemas.microsoft.com/office/drawing/2014/main" id="{69704FB4-4D28-4A39-B81F-407E0DDD475C}"/>
+                <a16:creationId xmlns:a16="http://schemas.microsoft.com/office/drawing/2014/main" xmlns="" id="{69704FB4-4D28-4A39-B81F-407E0DDD475C}"/>
               </a:ext>
             </a:extLst>
           </p:cNvPr>
@@ -875,7 +875,7 @@
           <a:p>
             <a:fld id="{542F47FF-5056-41FF-A1F8-23A414798AA4}" type="datetimeFigureOut">
               <a:rPr lang="en-SG" smtClean="0"/>
-              <a:t>29/7/2017</a:t>
+              <a:t>30/12/2017</a:t>
             </a:fld>
             <a:endParaRPr lang="en-SG"/>
           </a:p>
@@ -886,7 +886,7 @@
           <p:cNvPr id="5" name="Footer Placeholder 4">
             <a:extLst>
               <a:ext uri="{FF2B5EF4-FFF2-40B4-BE49-F238E27FC236}">
-                <a16:creationId xmlns:a16="http://schemas.microsoft.com/office/drawing/2014/main" id="{AFDB90F4-6173-409D-8731-A4C292C33336}"/>
+                <a16:creationId xmlns:a16="http://schemas.microsoft.com/office/drawing/2014/main" xmlns="" id="{AFDB90F4-6173-409D-8731-A4C292C33336}"/>
               </a:ext>
             </a:extLst>
           </p:cNvPr>
@@ -911,7 +911,7 @@
           <p:cNvPr id="6" name="Slide Number Placeholder 5">
             <a:extLst>
               <a:ext uri="{FF2B5EF4-FFF2-40B4-BE49-F238E27FC236}">
-                <a16:creationId xmlns:a16="http://schemas.microsoft.com/office/drawing/2014/main" id="{0C00E245-E701-4B2E-925D-4322EFA20D66}"/>
+                <a16:creationId xmlns:a16="http://schemas.microsoft.com/office/drawing/2014/main" xmlns="" id="{0C00E245-E701-4B2E-925D-4322EFA20D66}"/>
               </a:ext>
             </a:extLst>
           </p:cNvPr>
@@ -970,7 +970,7 @@
           <p:cNvPr id="2" name="Title 1">
             <a:extLst>
               <a:ext uri="{FF2B5EF4-FFF2-40B4-BE49-F238E27FC236}">
-                <a16:creationId xmlns:a16="http://schemas.microsoft.com/office/drawing/2014/main" id="{2237510E-B988-4DCB-9C02-932F190AC101}"/>
+                <a16:creationId xmlns:a16="http://schemas.microsoft.com/office/drawing/2014/main" xmlns="" id="{2237510E-B988-4DCB-9C02-932F190AC101}"/>
               </a:ext>
             </a:extLst>
           </p:cNvPr>
@@ -1008,7 +1008,7 @@
           <p:cNvPr id="3" name="Text Placeholder 2">
             <a:extLst>
               <a:ext uri="{FF2B5EF4-FFF2-40B4-BE49-F238E27FC236}">
-                <a16:creationId xmlns:a16="http://schemas.microsoft.com/office/drawing/2014/main" id="{784A23DD-6E19-4939-A085-751F973752F5}"/>
+                <a16:creationId xmlns:a16="http://schemas.microsoft.com/office/drawing/2014/main" xmlns="" id="{784A23DD-6E19-4939-A085-751F973752F5}"/>
               </a:ext>
             </a:extLst>
           </p:cNvPr>
@@ -1133,7 +1133,7 @@
           <p:cNvPr id="4" name="Date Placeholder 3">
             <a:extLst>
               <a:ext uri="{FF2B5EF4-FFF2-40B4-BE49-F238E27FC236}">
-                <a16:creationId xmlns:a16="http://schemas.microsoft.com/office/drawing/2014/main" id="{CD5B15F4-A7B8-4D17-8C46-94AC6465D19A}"/>
+                <a16:creationId xmlns:a16="http://schemas.microsoft.com/office/drawing/2014/main" xmlns="" id="{CD5B15F4-A7B8-4D17-8C46-94AC6465D19A}"/>
               </a:ext>
             </a:extLst>
           </p:cNvPr>
@@ -1151,7 +1151,7 @@
           <a:p>
             <a:fld id="{542F47FF-5056-41FF-A1F8-23A414798AA4}" type="datetimeFigureOut">
               <a:rPr lang="en-SG" smtClean="0"/>
-              <a:t>29/7/2017</a:t>
+              <a:t>30/12/2017</a:t>
             </a:fld>
             <a:endParaRPr lang="en-SG"/>
           </a:p>
@@ -1162,7 +1162,7 @@
           <p:cNvPr id="5" name="Footer Placeholder 4">
             <a:extLst>
               <a:ext uri="{FF2B5EF4-FFF2-40B4-BE49-F238E27FC236}">
-                <a16:creationId xmlns:a16="http://schemas.microsoft.com/office/drawing/2014/main" id="{0CC0B098-2820-40C0-8166-283BB17CD72D}"/>
+                <a16:creationId xmlns:a16="http://schemas.microsoft.com/office/drawing/2014/main" xmlns="" id="{0CC0B098-2820-40C0-8166-283BB17CD72D}"/>
               </a:ext>
             </a:extLst>
           </p:cNvPr>
@@ -1187,7 +1187,7 @@
           <p:cNvPr id="6" name="Slide Number Placeholder 5">
             <a:extLst>
               <a:ext uri="{FF2B5EF4-FFF2-40B4-BE49-F238E27FC236}">
-                <a16:creationId xmlns:a16="http://schemas.microsoft.com/office/drawing/2014/main" id="{CA1D6085-5297-4CE0-858B-F5A8477F21A1}"/>
+                <a16:creationId xmlns:a16="http://schemas.microsoft.com/office/drawing/2014/main" xmlns="" id="{CA1D6085-5297-4CE0-858B-F5A8477F21A1}"/>
               </a:ext>
             </a:extLst>
           </p:cNvPr>
@@ -1246,7 +1246,7 @@
           <p:cNvPr id="2" name="Title 1">
             <a:extLst>
               <a:ext uri="{FF2B5EF4-FFF2-40B4-BE49-F238E27FC236}">
-                <a16:creationId xmlns:a16="http://schemas.microsoft.com/office/drawing/2014/main" id="{C8312645-9305-4015-B5DF-8CD06CE54CD2}"/>
+                <a16:creationId xmlns:a16="http://schemas.microsoft.com/office/drawing/2014/main" xmlns="" id="{C8312645-9305-4015-B5DF-8CD06CE54CD2}"/>
               </a:ext>
             </a:extLst>
           </p:cNvPr>
@@ -1275,7 +1275,7 @@
           <p:cNvPr id="3" name="Content Placeholder 2">
             <a:extLst>
               <a:ext uri="{FF2B5EF4-FFF2-40B4-BE49-F238E27FC236}">
-                <a16:creationId xmlns:a16="http://schemas.microsoft.com/office/drawing/2014/main" id="{5F718F3D-23A6-4BAE-A195-9290BED99436}"/>
+                <a16:creationId xmlns:a16="http://schemas.microsoft.com/office/drawing/2014/main" xmlns="" id="{5F718F3D-23A6-4BAE-A195-9290BED99436}"/>
               </a:ext>
             </a:extLst>
           </p:cNvPr>
@@ -1338,7 +1338,7 @@
           <p:cNvPr id="4" name="Content Placeholder 3">
             <a:extLst>
               <a:ext uri="{FF2B5EF4-FFF2-40B4-BE49-F238E27FC236}">
-                <a16:creationId xmlns:a16="http://schemas.microsoft.com/office/drawing/2014/main" id="{987DE0C4-EF3A-42E6-9D3E-22C7A0BC9A37}"/>
+                <a16:creationId xmlns:a16="http://schemas.microsoft.com/office/drawing/2014/main" xmlns="" id="{987DE0C4-EF3A-42E6-9D3E-22C7A0BC9A37}"/>
               </a:ext>
             </a:extLst>
           </p:cNvPr>
@@ -1401,7 +1401,7 @@
           <p:cNvPr id="5" name="Date Placeholder 4">
             <a:extLst>
               <a:ext uri="{FF2B5EF4-FFF2-40B4-BE49-F238E27FC236}">
-                <a16:creationId xmlns:a16="http://schemas.microsoft.com/office/drawing/2014/main" id="{E4BFA167-4D74-44D4-AA06-F7DBEA7BB015}"/>
+                <a16:creationId xmlns:a16="http://schemas.microsoft.com/office/drawing/2014/main" xmlns="" id="{E4BFA167-4D74-44D4-AA06-F7DBEA7BB015}"/>
               </a:ext>
             </a:extLst>
           </p:cNvPr>
@@ -1419,7 +1419,7 @@
           <a:p>
             <a:fld id="{542F47FF-5056-41FF-A1F8-23A414798AA4}" type="datetimeFigureOut">
               <a:rPr lang="en-SG" smtClean="0"/>
-              <a:t>29/7/2017</a:t>
+              <a:t>30/12/2017</a:t>
             </a:fld>
             <a:endParaRPr lang="en-SG"/>
           </a:p>
@@ -1430,7 +1430,7 @@
           <p:cNvPr id="6" name="Footer Placeholder 5">
             <a:extLst>
               <a:ext uri="{FF2B5EF4-FFF2-40B4-BE49-F238E27FC236}">
-                <a16:creationId xmlns:a16="http://schemas.microsoft.com/office/drawing/2014/main" id="{000F966C-5803-470B-AFA7-C187FB7AE76F}"/>
+                <a16:creationId xmlns:a16="http://schemas.microsoft.com/office/drawing/2014/main" xmlns="" id="{000F966C-5803-470B-AFA7-C187FB7AE76F}"/>
               </a:ext>
             </a:extLst>
           </p:cNvPr>
@@ -1455,7 +1455,7 @@
           <p:cNvPr id="7" name="Slide Number Placeholder 6">
             <a:extLst>
               <a:ext uri="{FF2B5EF4-FFF2-40B4-BE49-F238E27FC236}">
-                <a16:creationId xmlns:a16="http://schemas.microsoft.com/office/drawing/2014/main" id="{C5072683-17F0-489D-BA30-0EAE1A9786AE}"/>
+                <a16:creationId xmlns:a16="http://schemas.microsoft.com/office/drawing/2014/main" xmlns="" id="{C5072683-17F0-489D-BA30-0EAE1A9786AE}"/>
               </a:ext>
             </a:extLst>
           </p:cNvPr>
@@ -1514,7 +1514,7 @@
           <p:cNvPr id="2" name="Title 1">
             <a:extLst>
               <a:ext uri="{FF2B5EF4-FFF2-40B4-BE49-F238E27FC236}">
-                <a16:creationId xmlns:a16="http://schemas.microsoft.com/office/drawing/2014/main" id="{CEC7B897-F9D1-4F32-BB47-48174A5ED64C}"/>
+                <a16:creationId xmlns:a16="http://schemas.microsoft.com/office/drawing/2014/main" xmlns="" id="{CEC7B897-F9D1-4F32-BB47-48174A5ED64C}"/>
               </a:ext>
             </a:extLst>
           </p:cNvPr>
@@ -1548,7 +1548,7 @@
           <p:cNvPr id="3" name="Text Placeholder 2">
             <a:extLst>
               <a:ext uri="{FF2B5EF4-FFF2-40B4-BE49-F238E27FC236}">
-                <a16:creationId xmlns:a16="http://schemas.microsoft.com/office/drawing/2014/main" id="{F641612B-9729-43C6-B566-AD5088E65020}"/>
+                <a16:creationId xmlns:a16="http://schemas.microsoft.com/office/drawing/2014/main" xmlns="" id="{F641612B-9729-43C6-B566-AD5088E65020}"/>
               </a:ext>
             </a:extLst>
           </p:cNvPr>
@@ -1619,7 +1619,7 @@
           <p:cNvPr id="4" name="Content Placeholder 3">
             <a:extLst>
               <a:ext uri="{FF2B5EF4-FFF2-40B4-BE49-F238E27FC236}">
-                <a16:creationId xmlns:a16="http://schemas.microsoft.com/office/drawing/2014/main" id="{C9E1DDFB-755B-486A-8E6E-CC7CFE66970C}"/>
+                <a16:creationId xmlns:a16="http://schemas.microsoft.com/office/drawing/2014/main" xmlns="" id="{C9E1DDFB-755B-486A-8E6E-CC7CFE66970C}"/>
               </a:ext>
             </a:extLst>
           </p:cNvPr>
@@ -1682,7 +1682,7 @@
           <p:cNvPr id="5" name="Text Placeholder 4">
             <a:extLst>
               <a:ext uri="{FF2B5EF4-FFF2-40B4-BE49-F238E27FC236}">
-                <a16:creationId xmlns:a16="http://schemas.microsoft.com/office/drawing/2014/main" id="{9C513BAE-7453-4E00-A4D1-7192F85ACD26}"/>
+                <a16:creationId xmlns:a16="http://schemas.microsoft.com/office/drawing/2014/main" xmlns="" id="{9C513BAE-7453-4E00-A4D1-7192F85ACD26}"/>
               </a:ext>
             </a:extLst>
           </p:cNvPr>
@@ -1753,7 +1753,7 @@
           <p:cNvPr id="6" name="Content Placeholder 5">
             <a:extLst>
               <a:ext uri="{FF2B5EF4-FFF2-40B4-BE49-F238E27FC236}">
-                <a16:creationId xmlns:a16="http://schemas.microsoft.com/office/drawing/2014/main" id="{CD44104D-C0AE-4458-869E-DFF710C415CC}"/>
+                <a16:creationId xmlns:a16="http://schemas.microsoft.com/office/drawing/2014/main" xmlns="" id="{CD44104D-C0AE-4458-869E-DFF710C415CC}"/>
               </a:ext>
             </a:extLst>
           </p:cNvPr>
@@ -1816,7 +1816,7 @@
           <p:cNvPr id="7" name="Date Placeholder 6">
             <a:extLst>
               <a:ext uri="{FF2B5EF4-FFF2-40B4-BE49-F238E27FC236}">
-                <a16:creationId xmlns:a16="http://schemas.microsoft.com/office/drawing/2014/main" id="{4CB7CAF3-D690-40A3-88F7-9D0D17864C18}"/>
+                <a16:creationId xmlns:a16="http://schemas.microsoft.com/office/drawing/2014/main" xmlns="" id="{4CB7CAF3-D690-40A3-88F7-9D0D17864C18}"/>
               </a:ext>
             </a:extLst>
           </p:cNvPr>
@@ -1834,7 +1834,7 @@
           <a:p>
             <a:fld id="{542F47FF-5056-41FF-A1F8-23A414798AA4}" type="datetimeFigureOut">
               <a:rPr lang="en-SG" smtClean="0"/>
-              <a:t>29/7/2017</a:t>
+              <a:t>30/12/2017</a:t>
             </a:fld>
             <a:endParaRPr lang="en-SG"/>
           </a:p>
@@ -1845,7 +1845,7 @@
           <p:cNvPr id="8" name="Footer Placeholder 7">
             <a:extLst>
               <a:ext uri="{FF2B5EF4-FFF2-40B4-BE49-F238E27FC236}">
-                <a16:creationId xmlns:a16="http://schemas.microsoft.com/office/drawing/2014/main" id="{E3FCCAB0-63DD-4704-AA42-E4F81E641DA3}"/>
+                <a16:creationId xmlns:a16="http://schemas.microsoft.com/office/drawing/2014/main" xmlns="" id="{E3FCCAB0-63DD-4704-AA42-E4F81E641DA3}"/>
               </a:ext>
             </a:extLst>
           </p:cNvPr>
@@ -1870,7 +1870,7 @@
           <p:cNvPr id="9" name="Slide Number Placeholder 8">
             <a:extLst>
               <a:ext uri="{FF2B5EF4-FFF2-40B4-BE49-F238E27FC236}">
-                <a16:creationId xmlns:a16="http://schemas.microsoft.com/office/drawing/2014/main" id="{604EFCC3-8687-4BC3-9C9E-60FD561B237F}"/>
+                <a16:creationId xmlns:a16="http://schemas.microsoft.com/office/drawing/2014/main" xmlns="" id="{604EFCC3-8687-4BC3-9C9E-60FD561B237F}"/>
               </a:ext>
             </a:extLst>
           </p:cNvPr>
@@ -1929,7 +1929,7 @@
           <p:cNvPr id="2" name="Title 1">
             <a:extLst>
               <a:ext uri="{FF2B5EF4-FFF2-40B4-BE49-F238E27FC236}">
-                <a16:creationId xmlns:a16="http://schemas.microsoft.com/office/drawing/2014/main" id="{D324AE97-E2C9-4642-887A-4474C5566AA6}"/>
+                <a16:creationId xmlns:a16="http://schemas.microsoft.com/office/drawing/2014/main" xmlns="" id="{D324AE97-E2C9-4642-887A-4474C5566AA6}"/>
               </a:ext>
             </a:extLst>
           </p:cNvPr>
@@ -1958,7 +1958,7 @@
           <p:cNvPr id="3" name="Date Placeholder 2">
             <a:extLst>
               <a:ext uri="{FF2B5EF4-FFF2-40B4-BE49-F238E27FC236}">
-                <a16:creationId xmlns:a16="http://schemas.microsoft.com/office/drawing/2014/main" id="{919EDCEA-D8A9-431E-AF93-4824C03FD0F2}"/>
+                <a16:creationId xmlns:a16="http://schemas.microsoft.com/office/drawing/2014/main" xmlns="" id="{919EDCEA-D8A9-431E-AF93-4824C03FD0F2}"/>
               </a:ext>
             </a:extLst>
           </p:cNvPr>
@@ -1976,7 +1976,7 @@
           <a:p>
             <a:fld id="{542F47FF-5056-41FF-A1F8-23A414798AA4}" type="datetimeFigureOut">
               <a:rPr lang="en-SG" smtClean="0"/>
-              <a:t>29/7/2017</a:t>
+              <a:t>30/12/2017</a:t>
             </a:fld>
             <a:endParaRPr lang="en-SG"/>
           </a:p>
@@ -1987,7 +1987,7 @@
           <p:cNvPr id="4" name="Footer Placeholder 3">
             <a:extLst>
               <a:ext uri="{FF2B5EF4-FFF2-40B4-BE49-F238E27FC236}">
-                <a16:creationId xmlns:a16="http://schemas.microsoft.com/office/drawing/2014/main" id="{1F13DD51-16D3-435A-A475-0C2A7255A05E}"/>
+                <a16:creationId xmlns:a16="http://schemas.microsoft.com/office/drawing/2014/main" xmlns="" id="{1F13DD51-16D3-435A-A475-0C2A7255A05E}"/>
               </a:ext>
             </a:extLst>
           </p:cNvPr>
@@ -2012,7 +2012,7 @@
           <p:cNvPr id="5" name="Slide Number Placeholder 4">
             <a:extLst>
               <a:ext uri="{FF2B5EF4-FFF2-40B4-BE49-F238E27FC236}">
-                <a16:creationId xmlns:a16="http://schemas.microsoft.com/office/drawing/2014/main" id="{3D7AC15F-BADE-4466-835A-57B1A9E5162B}"/>
+                <a16:creationId xmlns:a16="http://schemas.microsoft.com/office/drawing/2014/main" xmlns="" id="{3D7AC15F-BADE-4466-835A-57B1A9E5162B}"/>
               </a:ext>
             </a:extLst>
           </p:cNvPr>
@@ -2071,7 +2071,7 @@
           <p:cNvPr id="2" name="Date Placeholder 1">
             <a:extLst>
               <a:ext uri="{FF2B5EF4-FFF2-40B4-BE49-F238E27FC236}">
-                <a16:creationId xmlns:a16="http://schemas.microsoft.com/office/drawing/2014/main" id="{48F01CC8-EEC4-4B3C-8C73-3EBB7DCEBE67}"/>
+                <a16:creationId xmlns:a16="http://schemas.microsoft.com/office/drawing/2014/main" xmlns="" id="{48F01CC8-EEC4-4B3C-8C73-3EBB7DCEBE67}"/>
               </a:ext>
             </a:extLst>
           </p:cNvPr>
@@ -2089,7 +2089,7 @@
           <a:p>
             <a:fld id="{542F47FF-5056-41FF-A1F8-23A414798AA4}" type="datetimeFigureOut">
               <a:rPr lang="en-SG" smtClean="0"/>
-              <a:t>29/7/2017</a:t>
+              <a:t>30/12/2017</a:t>
             </a:fld>
             <a:endParaRPr lang="en-SG"/>
           </a:p>
@@ -2100,7 +2100,7 @@
           <p:cNvPr id="3" name="Footer Placeholder 2">
             <a:extLst>
               <a:ext uri="{FF2B5EF4-FFF2-40B4-BE49-F238E27FC236}">
-                <a16:creationId xmlns:a16="http://schemas.microsoft.com/office/drawing/2014/main" id="{4D820BAF-6E28-43DA-9E9B-8C229AB2A964}"/>
+                <a16:creationId xmlns:a16="http://schemas.microsoft.com/office/drawing/2014/main" xmlns="" id="{4D820BAF-6E28-43DA-9E9B-8C229AB2A964}"/>
               </a:ext>
             </a:extLst>
           </p:cNvPr>
@@ -2125,7 +2125,7 @@
           <p:cNvPr id="4" name="Slide Number Placeholder 3">
             <a:extLst>
               <a:ext uri="{FF2B5EF4-FFF2-40B4-BE49-F238E27FC236}">
-                <a16:creationId xmlns:a16="http://schemas.microsoft.com/office/drawing/2014/main" id="{49BFE3EF-B472-4F66-80D5-1B722E8086E6}"/>
+                <a16:creationId xmlns:a16="http://schemas.microsoft.com/office/drawing/2014/main" xmlns="" id="{49BFE3EF-B472-4F66-80D5-1B722E8086E6}"/>
               </a:ext>
             </a:extLst>
           </p:cNvPr>
@@ -2184,7 +2184,7 @@
           <p:cNvPr id="2" name="Title 1">
             <a:extLst>
               <a:ext uri="{FF2B5EF4-FFF2-40B4-BE49-F238E27FC236}">
-                <a16:creationId xmlns:a16="http://schemas.microsoft.com/office/drawing/2014/main" id="{E1ABDE73-0F58-47D3-8C8B-C147DE1C0B22}"/>
+                <a16:creationId xmlns:a16="http://schemas.microsoft.com/office/drawing/2014/main" xmlns="" id="{E1ABDE73-0F58-47D3-8C8B-C147DE1C0B22}"/>
               </a:ext>
             </a:extLst>
           </p:cNvPr>
@@ -2222,7 +2222,7 @@
           <p:cNvPr id="3" name="Content Placeholder 2">
             <a:extLst>
               <a:ext uri="{FF2B5EF4-FFF2-40B4-BE49-F238E27FC236}">
-                <a16:creationId xmlns:a16="http://schemas.microsoft.com/office/drawing/2014/main" id="{0167F6A8-B979-42A6-B421-40577DD5582F}"/>
+                <a16:creationId xmlns:a16="http://schemas.microsoft.com/office/drawing/2014/main" xmlns="" id="{0167F6A8-B979-42A6-B421-40577DD5582F}"/>
               </a:ext>
             </a:extLst>
           </p:cNvPr>
@@ -2313,7 +2313,7 @@
           <p:cNvPr id="4" name="Text Placeholder 3">
             <a:extLst>
               <a:ext uri="{FF2B5EF4-FFF2-40B4-BE49-F238E27FC236}">
-                <a16:creationId xmlns:a16="http://schemas.microsoft.com/office/drawing/2014/main" id="{6887A488-06FE-46E9-8AC5-DF38A61CCF05}"/>
+                <a16:creationId xmlns:a16="http://schemas.microsoft.com/office/drawing/2014/main" xmlns="" id="{6887A488-06FE-46E9-8AC5-DF38A61CCF05}"/>
               </a:ext>
             </a:extLst>
           </p:cNvPr>
@@ -2384,7 +2384,7 @@
           <p:cNvPr id="5" name="Date Placeholder 4">
             <a:extLst>
               <a:ext uri="{FF2B5EF4-FFF2-40B4-BE49-F238E27FC236}">
-                <a16:creationId xmlns:a16="http://schemas.microsoft.com/office/drawing/2014/main" id="{1225C56B-78B2-45C0-A8A9-C9D435A286D0}"/>
+                <a16:creationId xmlns:a16="http://schemas.microsoft.com/office/drawing/2014/main" xmlns="" id="{1225C56B-78B2-45C0-A8A9-C9D435A286D0}"/>
               </a:ext>
             </a:extLst>
           </p:cNvPr>
@@ -2402,7 +2402,7 @@
           <a:p>
             <a:fld id="{542F47FF-5056-41FF-A1F8-23A414798AA4}" type="datetimeFigureOut">
               <a:rPr lang="en-SG" smtClean="0"/>
-              <a:t>29/7/2017</a:t>
+              <a:t>30/12/2017</a:t>
             </a:fld>
             <a:endParaRPr lang="en-SG"/>
           </a:p>
@@ -2413,7 +2413,7 @@
           <p:cNvPr id="6" name="Footer Placeholder 5">
             <a:extLst>
               <a:ext uri="{FF2B5EF4-FFF2-40B4-BE49-F238E27FC236}">
-                <a16:creationId xmlns:a16="http://schemas.microsoft.com/office/drawing/2014/main" id="{3F9E1B9E-B673-4E26-9323-D731DC395F9C}"/>
+                <a16:creationId xmlns:a16="http://schemas.microsoft.com/office/drawing/2014/main" xmlns="" id="{3F9E1B9E-B673-4E26-9323-D731DC395F9C}"/>
               </a:ext>
             </a:extLst>
           </p:cNvPr>
@@ -2438,7 +2438,7 @@
           <p:cNvPr id="7" name="Slide Number Placeholder 6">
             <a:extLst>
               <a:ext uri="{FF2B5EF4-FFF2-40B4-BE49-F238E27FC236}">
-                <a16:creationId xmlns:a16="http://schemas.microsoft.com/office/drawing/2014/main" id="{6633AB4A-8EB3-4154-869B-5580DEDF4F79}"/>
+                <a16:creationId xmlns:a16="http://schemas.microsoft.com/office/drawing/2014/main" xmlns="" id="{6633AB4A-8EB3-4154-869B-5580DEDF4F79}"/>
               </a:ext>
             </a:extLst>
           </p:cNvPr>
@@ -2497,7 +2497,7 @@
           <p:cNvPr id="2" name="Title 1">
             <a:extLst>
               <a:ext uri="{FF2B5EF4-FFF2-40B4-BE49-F238E27FC236}">
-                <a16:creationId xmlns:a16="http://schemas.microsoft.com/office/drawing/2014/main" id="{61D5430E-44A7-4B67-9F34-F532D5533356}"/>
+                <a16:creationId xmlns:a16="http://schemas.microsoft.com/office/drawing/2014/main" xmlns="" id="{61D5430E-44A7-4B67-9F34-F532D5533356}"/>
               </a:ext>
             </a:extLst>
           </p:cNvPr>
@@ -2535,7 +2535,7 @@
           <p:cNvPr id="3" name="Picture Placeholder 2">
             <a:extLst>
               <a:ext uri="{FF2B5EF4-FFF2-40B4-BE49-F238E27FC236}">
-                <a16:creationId xmlns:a16="http://schemas.microsoft.com/office/drawing/2014/main" id="{94374BCC-AC4A-4ED0-A7BD-6B2491EAED7E}"/>
+                <a16:creationId xmlns:a16="http://schemas.microsoft.com/office/drawing/2014/main" xmlns="" id="{94374BCC-AC4A-4ED0-A7BD-6B2491EAED7E}"/>
               </a:ext>
             </a:extLst>
           </p:cNvPr>
@@ -2602,7 +2602,7 @@
           <p:cNvPr id="4" name="Text Placeholder 3">
             <a:extLst>
               <a:ext uri="{FF2B5EF4-FFF2-40B4-BE49-F238E27FC236}">
-                <a16:creationId xmlns:a16="http://schemas.microsoft.com/office/drawing/2014/main" id="{5AD4568E-164B-462E-9285-49B735DD9DE7}"/>
+                <a16:creationId xmlns:a16="http://schemas.microsoft.com/office/drawing/2014/main" xmlns="" id="{5AD4568E-164B-462E-9285-49B735DD9DE7}"/>
               </a:ext>
             </a:extLst>
           </p:cNvPr>
@@ -2673,7 +2673,7 @@
           <p:cNvPr id="5" name="Date Placeholder 4">
             <a:extLst>
               <a:ext uri="{FF2B5EF4-FFF2-40B4-BE49-F238E27FC236}">
-                <a16:creationId xmlns:a16="http://schemas.microsoft.com/office/drawing/2014/main" id="{ABD88AB5-C9D0-4013-85B4-2228545F24AD}"/>
+                <a16:creationId xmlns:a16="http://schemas.microsoft.com/office/drawing/2014/main" xmlns="" id="{ABD88AB5-C9D0-4013-85B4-2228545F24AD}"/>
               </a:ext>
             </a:extLst>
           </p:cNvPr>
@@ -2691,7 +2691,7 @@
           <a:p>
             <a:fld id="{542F47FF-5056-41FF-A1F8-23A414798AA4}" type="datetimeFigureOut">
               <a:rPr lang="en-SG" smtClean="0"/>
-              <a:t>29/7/2017</a:t>
+              <a:t>30/12/2017</a:t>
             </a:fld>
             <a:endParaRPr lang="en-SG"/>
           </a:p>
@@ -2702,7 +2702,7 @@
           <p:cNvPr id="6" name="Footer Placeholder 5">
             <a:extLst>
               <a:ext uri="{FF2B5EF4-FFF2-40B4-BE49-F238E27FC236}">
-                <a16:creationId xmlns:a16="http://schemas.microsoft.com/office/drawing/2014/main" id="{6378A798-E2A6-4417-A003-DE553E8EC325}"/>
+                <a16:creationId xmlns:a16="http://schemas.microsoft.com/office/drawing/2014/main" xmlns="" id="{6378A798-E2A6-4417-A003-DE553E8EC325}"/>
               </a:ext>
             </a:extLst>
           </p:cNvPr>
@@ -2727,7 +2727,7 @@
           <p:cNvPr id="7" name="Slide Number Placeholder 6">
             <a:extLst>
               <a:ext uri="{FF2B5EF4-FFF2-40B4-BE49-F238E27FC236}">
-                <a16:creationId xmlns:a16="http://schemas.microsoft.com/office/drawing/2014/main" id="{7BC6852D-C345-455C-9499-B57AE4D2D943}"/>
+                <a16:creationId xmlns:a16="http://schemas.microsoft.com/office/drawing/2014/main" xmlns="" id="{7BC6852D-C345-455C-9499-B57AE4D2D943}"/>
               </a:ext>
             </a:extLst>
           </p:cNvPr>
@@ -2791,7 +2791,7 @@
           <p:cNvPr id="2" name="Title Placeholder 1">
             <a:extLst>
               <a:ext uri="{FF2B5EF4-FFF2-40B4-BE49-F238E27FC236}">
-                <a16:creationId xmlns:a16="http://schemas.microsoft.com/office/drawing/2014/main" id="{CF097353-E272-4974-B34C-369C28928CA1}"/>
+                <a16:creationId xmlns:a16="http://schemas.microsoft.com/office/drawing/2014/main" xmlns="" id="{CF097353-E272-4974-B34C-369C28928CA1}"/>
               </a:ext>
             </a:extLst>
           </p:cNvPr>
@@ -2830,7 +2830,7 @@
           <p:cNvPr id="3" name="Text Placeholder 2">
             <a:extLst>
               <a:ext uri="{FF2B5EF4-FFF2-40B4-BE49-F238E27FC236}">
-                <a16:creationId xmlns:a16="http://schemas.microsoft.com/office/drawing/2014/main" id="{BB1BE290-84C1-4415-A557-1ACC36D1226C}"/>
+                <a16:creationId xmlns:a16="http://schemas.microsoft.com/office/drawing/2014/main" xmlns="" id="{BB1BE290-84C1-4415-A557-1ACC36D1226C}"/>
               </a:ext>
             </a:extLst>
           </p:cNvPr>
@@ -2898,7 +2898,7 @@
           <p:cNvPr id="4" name="Date Placeholder 3">
             <a:extLst>
               <a:ext uri="{FF2B5EF4-FFF2-40B4-BE49-F238E27FC236}">
-                <a16:creationId xmlns:a16="http://schemas.microsoft.com/office/drawing/2014/main" id="{F7EAAB47-96EA-44D5-8293-0D696F52A395}"/>
+                <a16:creationId xmlns:a16="http://schemas.microsoft.com/office/drawing/2014/main" xmlns="" id="{F7EAAB47-96EA-44D5-8293-0D696F52A395}"/>
               </a:ext>
             </a:extLst>
           </p:cNvPr>
@@ -2934,7 +2934,7 @@
           <a:p>
             <a:fld id="{542F47FF-5056-41FF-A1F8-23A414798AA4}" type="datetimeFigureOut">
               <a:rPr lang="en-SG" smtClean="0"/>
-              <a:t>29/7/2017</a:t>
+              <a:t>30/12/2017</a:t>
             </a:fld>
             <a:endParaRPr lang="en-SG"/>
           </a:p>
@@ -2945,7 +2945,7 @@
           <p:cNvPr id="5" name="Footer Placeholder 4">
             <a:extLst>
               <a:ext uri="{FF2B5EF4-FFF2-40B4-BE49-F238E27FC236}">
-                <a16:creationId xmlns:a16="http://schemas.microsoft.com/office/drawing/2014/main" id="{F21C6E84-C98D-4391-98A0-E77A4221131C}"/>
+                <a16:creationId xmlns:a16="http://schemas.microsoft.com/office/drawing/2014/main" xmlns="" id="{F21C6E84-C98D-4391-98A0-E77A4221131C}"/>
               </a:ext>
             </a:extLst>
           </p:cNvPr>
@@ -2988,7 +2988,7 @@
           <p:cNvPr id="6" name="Slide Number Placeholder 5">
             <a:extLst>
               <a:ext uri="{FF2B5EF4-FFF2-40B4-BE49-F238E27FC236}">
-                <a16:creationId xmlns:a16="http://schemas.microsoft.com/office/drawing/2014/main" id="{FB352E9C-7394-48E0-A08D-56390F6520E1}"/>
+                <a16:creationId xmlns:a16="http://schemas.microsoft.com/office/drawing/2014/main" xmlns="" id="{FB352E9C-7394-48E0-A08D-56390F6520E1}"/>
               </a:ext>
             </a:extLst>
           </p:cNvPr>
@@ -3356,7 +3356,7 @@
           <p:cNvPr id="4" name="Oval 3">
             <a:extLst>
               <a:ext uri="{FF2B5EF4-FFF2-40B4-BE49-F238E27FC236}">
-                <a16:creationId xmlns:a16="http://schemas.microsoft.com/office/drawing/2014/main" id="{D45F487B-A914-4C8E-B564-00C9D621567D}"/>
+                <a16:creationId xmlns:a16="http://schemas.microsoft.com/office/drawing/2014/main" xmlns="" id="{D45F487B-A914-4C8E-B564-00C9D621567D}"/>
               </a:ext>
             </a:extLst>
           </p:cNvPr>
@@ -3365,7 +3365,7 @@
         </p:nvSpPr>
         <p:spPr>
           <a:xfrm>
-            <a:off x="3809163" y="-790611"/>
+            <a:off x="1120632" y="3200056"/>
             <a:ext cx="235669" cy="235669"/>
           </a:xfrm>
           <a:prstGeom prst="ellipse">
@@ -3405,20 +3405,21 @@
           <p:cNvPr id="6" name="Straight Arrow Connector 5">
             <a:extLst>
               <a:ext uri="{FF2B5EF4-FFF2-40B4-BE49-F238E27FC236}">
-                <a16:creationId xmlns:a16="http://schemas.microsoft.com/office/drawing/2014/main" id="{73D6638D-34B0-4D9A-B7DC-62ABF1C7D407}"/>
+                <a16:creationId xmlns:a16="http://schemas.microsoft.com/office/drawing/2014/main" xmlns="" id="{73D6638D-34B0-4D9A-B7DC-62ABF1C7D407}"/>
               </a:ext>
             </a:extLst>
           </p:cNvPr>
           <p:cNvCxnSpPr>
             <a:cxnSpLocks/>
             <a:stCxn id="4" idx="6"/>
+            <a:endCxn id="8" idx="1"/>
           </p:cNvCxnSpPr>
           <p:nvPr/>
         </p:nvCxnSpPr>
         <p:spPr>
           <a:xfrm>
-            <a:off x="4044835" y="-672776"/>
-            <a:ext cx="933253" cy="0"/>
+            <a:off x="1356301" y="3317891"/>
+            <a:ext cx="227605" cy="839"/>
           </a:xfrm>
           <a:prstGeom prst="straightConnector1">
             <a:avLst/>
@@ -3447,7 +3448,7 @@
           <p:cNvPr id="8" name="Rectangle: Rounded Corners 7">
             <a:extLst>
               <a:ext uri="{FF2B5EF4-FFF2-40B4-BE49-F238E27FC236}">
-                <a16:creationId xmlns:a16="http://schemas.microsoft.com/office/drawing/2014/main" id="{C13E6F3C-30CD-49FB-94D8-AF011F54E935}"/>
+                <a16:creationId xmlns:a16="http://schemas.microsoft.com/office/drawing/2014/main" xmlns="" id="{C13E6F3C-30CD-49FB-94D8-AF011F54E935}"/>
               </a:ext>
             </a:extLst>
           </p:cNvPr>
@@ -3456,8 +3457,8 @@
         </p:nvSpPr>
         <p:spPr>
           <a:xfrm>
-            <a:off x="4978087" y="-1030995"/>
-            <a:ext cx="2187019" cy="716437"/>
+            <a:off x="1583906" y="2960511"/>
+            <a:ext cx="1570355" cy="716437"/>
           </a:xfrm>
           <a:prstGeom prst="roundRect">
             <a:avLst/>
@@ -3499,20 +3500,20 @@
           <p:cNvPr id="9" name="Straight Arrow Connector 8">
             <a:extLst>
               <a:ext uri="{FF2B5EF4-FFF2-40B4-BE49-F238E27FC236}">
-                <a16:creationId xmlns:a16="http://schemas.microsoft.com/office/drawing/2014/main" id="{6A0B3198-7B18-417D-A041-B13DF5BAE7A6}"/>
+                <a16:creationId xmlns:a16="http://schemas.microsoft.com/office/drawing/2014/main" xmlns="" id="{6A0B3198-7B18-417D-A041-B13DF5BAE7A6}"/>
               </a:ext>
             </a:extLst>
           </p:cNvPr>
           <p:cNvCxnSpPr>
             <a:cxnSpLocks/>
-            <a:stCxn id="8" idx="2"/>
+            <a:stCxn id="8" idx="3"/>
           </p:cNvCxnSpPr>
           <p:nvPr/>
         </p:nvCxnSpPr>
         <p:spPr>
-          <a:xfrm flipH="1">
-            <a:off x="6071597" y="-314557"/>
-            <a:ext cx="2" cy="617456"/>
+          <a:xfrm flipV="1">
+            <a:off x="3154261" y="3317892"/>
+            <a:ext cx="389055" cy="838"/>
           </a:xfrm>
           <a:prstGeom prst="straightConnector1">
             <a:avLst/>
@@ -3541,7 +3542,7 @@
           <p:cNvPr id="12" name="Diamond 11">
             <a:extLst>
               <a:ext uri="{FF2B5EF4-FFF2-40B4-BE49-F238E27FC236}">
-                <a16:creationId xmlns:a16="http://schemas.microsoft.com/office/drawing/2014/main" id="{8E8723C3-03E7-46BE-8211-AAF9ADC7B033}"/>
+                <a16:creationId xmlns:a16="http://schemas.microsoft.com/office/drawing/2014/main" xmlns="" id="{8E8723C3-03E7-46BE-8211-AAF9ADC7B033}"/>
               </a:ext>
             </a:extLst>
           </p:cNvPr>
@@ -3550,7 +3551,7 @@
         </p:nvSpPr>
         <p:spPr>
           <a:xfrm>
-            <a:off x="5831214" y="302899"/>
+            <a:off x="3543314" y="3077508"/>
             <a:ext cx="480766" cy="480766"/>
           </a:xfrm>
           <a:prstGeom prst="diamond">
@@ -3585,101 +3586,22 @@
           </a:p>
         </p:txBody>
       </p:sp>
-      <p:cxnSp>
-        <p:nvCxnSpPr>
-          <p:cNvPr id="15" name="Straight Arrow Connector 14">
-            <a:extLst>
-              <a:ext uri="{FF2B5EF4-FFF2-40B4-BE49-F238E27FC236}">
-                <a16:creationId xmlns:a16="http://schemas.microsoft.com/office/drawing/2014/main" id="{46F847A3-19CB-4D8A-BF61-CBF1573B6170}"/>
-              </a:ext>
-            </a:extLst>
-          </p:cNvPr>
-          <p:cNvCxnSpPr>
-            <a:cxnSpLocks/>
-          </p:cNvCxnSpPr>
+      <p:sp>
+        <p:nvSpPr>
+          <p:cNvPr id="19" name="TextBox 18">
+            <a:extLst>
+              <a:ext uri="{FF2B5EF4-FFF2-40B4-BE49-F238E27FC236}">
+                <a16:creationId xmlns:a16="http://schemas.microsoft.com/office/drawing/2014/main" xmlns="" id="{3ABD3846-DF71-49C4-AE22-6CE1C8B39149}"/>
+              </a:ext>
+            </a:extLst>
+          </p:cNvPr>
+          <p:cNvSpPr txBox="1"/>
           <p:nvPr/>
-        </p:nvCxnSpPr>
-        <p:spPr>
-          <a:xfrm flipH="1">
-            <a:off x="5158771" y="543281"/>
-            <a:ext cx="2" cy="1003956"/>
-          </a:xfrm>
-          <a:prstGeom prst="straightConnector1">
-            <a:avLst/>
-          </a:prstGeom>
-          <a:ln>
-            <a:tailEnd type="triangle"/>
-          </a:ln>
-        </p:spPr>
-        <p:style>
-          <a:lnRef idx="1">
-            <a:schemeClr val="dk1"/>
-          </a:lnRef>
-          <a:fillRef idx="0">
-            <a:schemeClr val="dk1"/>
-          </a:fillRef>
-          <a:effectRef idx="0">
-            <a:schemeClr val="dk1"/>
-          </a:effectRef>
-          <a:fontRef idx="minor">
-            <a:schemeClr val="tx1"/>
-          </a:fontRef>
-        </p:style>
-      </p:cxnSp>
-      <p:cxnSp>
-        <p:nvCxnSpPr>
-          <p:cNvPr id="18" name="Straight Connector 17">
-            <a:extLst>
-              <a:ext uri="{FF2B5EF4-FFF2-40B4-BE49-F238E27FC236}">
-                <a16:creationId xmlns:a16="http://schemas.microsoft.com/office/drawing/2014/main" id="{E9F9F46E-F315-4E20-BA19-DC5A481900A9}"/>
-              </a:ext>
-            </a:extLst>
-          </p:cNvPr>
-          <p:cNvCxnSpPr>
-            <a:endCxn id="12" idx="1"/>
-          </p:cNvCxnSpPr>
-          <p:nvPr/>
-        </p:nvCxnSpPr>
+        </p:nvSpPr>
         <p:spPr>
           <a:xfrm>
-            <a:off x="5158768" y="543281"/>
-            <a:ext cx="672444" cy="2"/>
-          </a:xfrm>
-          <a:prstGeom prst="line">
-            <a:avLst/>
-          </a:prstGeom>
-        </p:spPr>
-        <p:style>
-          <a:lnRef idx="1">
-            <a:schemeClr val="dk1"/>
-          </a:lnRef>
-          <a:fillRef idx="0">
-            <a:schemeClr val="dk1"/>
-          </a:fillRef>
-          <a:effectRef idx="0">
-            <a:schemeClr val="dk1"/>
-          </a:effectRef>
-          <a:fontRef idx="minor">
-            <a:schemeClr val="tx1"/>
-          </a:fontRef>
-        </p:style>
-      </p:cxnSp>
-      <p:sp>
-        <p:nvSpPr>
-          <p:cNvPr id="19" name="TextBox 18">
-            <a:extLst>
-              <a:ext uri="{FF2B5EF4-FFF2-40B4-BE49-F238E27FC236}">
-                <a16:creationId xmlns:a16="http://schemas.microsoft.com/office/drawing/2014/main" id="{3ABD3846-DF71-49C4-AE22-6CE1C8B39149}"/>
-              </a:ext>
-            </a:extLst>
-          </p:cNvPr>
-          <p:cNvSpPr txBox="1"/>
-          <p:nvPr/>
-        </p:nvSpPr>
-        <p:spPr>
-          <a:xfrm>
-            <a:off x="4051905" y="118232"/>
-            <a:ext cx="1899500" cy="369460"/>
+            <a:off x="3721078" y="2483753"/>
+            <a:ext cx="1602669" cy="369460"/>
           </a:xfrm>
           <a:prstGeom prst="rect">
             <a:avLst/>
@@ -3693,18 +3615,18 @@
           <a:lstStyle/>
           <a:p>
             <a:r>
-              <a:rPr lang="en-SG" sz="1801" dirty="0"/>
-              <a:t>[not </a:t>
-            </a:r>
-            <a:r>
-              <a:rPr lang="en-SG" sz="1600" dirty="0">
+              <a:rPr lang="en-SG" sz="1801" dirty="0" smtClean="0"/>
+              <a:t>[</a:t>
+            </a:r>
+            <a:r>
+              <a:rPr lang="en-SG" sz="1600" dirty="0" smtClean="0">
                 <a:latin typeface="Consolas" panose="020B0609020204030204" pitchFamily="49" charset="0"/>
               </a:rPr>
               <a:t>undo</a:t>
             </a:r>
             <a:r>
-              <a:rPr lang="en-SG" sz="1801" dirty="0"/>
-              <a:t> &amp; </a:t>
+              <a:rPr lang="en-SG" sz="1801" dirty="0" smtClean="0"/>
+              <a:t> or </a:t>
             </a:r>
             <a:r>
               <a:rPr lang="en-SG" sz="1600" dirty="0">
@@ -3724,7 +3646,7 @@
           <p:cNvPr id="20" name="TextBox 19">
             <a:extLst>
               <a:ext uri="{FF2B5EF4-FFF2-40B4-BE49-F238E27FC236}">
-                <a16:creationId xmlns:a16="http://schemas.microsoft.com/office/drawing/2014/main" id="{950BB788-4B9F-4654-A5F0-F380DA681824}"/>
+                <a16:creationId xmlns:a16="http://schemas.microsoft.com/office/drawing/2014/main" xmlns="" id="{950BB788-4B9F-4654-A5F0-F380DA681824}"/>
               </a:ext>
             </a:extLst>
           </p:cNvPr>
@@ -3733,7 +3655,7 @@
         </p:nvSpPr>
         <p:spPr>
           <a:xfrm>
-            <a:off x="6311979" y="118233"/>
+            <a:off x="3348788" y="3779313"/>
             <a:ext cx="853127" cy="369460"/>
           </a:xfrm>
           <a:prstGeom prst="rect">
@@ -3759,7 +3681,7 @@
           <p:cNvPr id="22" name="Rectangle: Rounded Corners 21">
             <a:extLst>
               <a:ext uri="{FF2B5EF4-FFF2-40B4-BE49-F238E27FC236}">
-                <a16:creationId xmlns:a16="http://schemas.microsoft.com/office/drawing/2014/main" id="{A323A4FC-FF89-4B75-A4E8-6FA28B7DCA83}"/>
+                <a16:creationId xmlns:a16="http://schemas.microsoft.com/office/drawing/2014/main" xmlns="" id="{A323A4FC-FF89-4B75-A4E8-6FA28B7DCA83}"/>
               </a:ext>
             </a:extLst>
           </p:cNvPr>
@@ -3768,8 +3690,8 @@
         </p:nvSpPr>
         <p:spPr>
           <a:xfrm>
-            <a:off x="4044834" y="1547238"/>
-            <a:ext cx="2187019" cy="527900"/>
+            <a:off x="4111838" y="3491842"/>
+            <a:ext cx="1346134" cy="527900"/>
           </a:xfrm>
           <a:prstGeom prst="roundRect">
             <a:avLst/>
@@ -3806,60 +3728,21 @@
           </a:p>
         </p:txBody>
       </p:sp>
-      <p:cxnSp>
-        <p:nvCxnSpPr>
-          <p:cNvPr id="23" name="Straight Connector 22">
-            <a:extLst>
-              <a:ext uri="{FF2B5EF4-FFF2-40B4-BE49-F238E27FC236}">
-                <a16:creationId xmlns:a16="http://schemas.microsoft.com/office/drawing/2014/main" id="{976EB2B1-1493-46AA-8AF8-DC04DBB508E9}"/>
-              </a:ext>
-            </a:extLst>
-          </p:cNvPr>
-          <p:cNvCxnSpPr>
-            <a:cxnSpLocks/>
-            <a:stCxn id="12" idx="3"/>
-          </p:cNvCxnSpPr>
+      <p:sp>
+        <p:nvSpPr>
+          <p:cNvPr id="26" name="Diamond 25">
+            <a:extLst>
+              <a:ext uri="{FF2B5EF4-FFF2-40B4-BE49-F238E27FC236}">
+                <a16:creationId xmlns:a16="http://schemas.microsoft.com/office/drawing/2014/main" xmlns="" id="{CEFA5E0B-0718-4C33-83E9-398CBD71772D}"/>
+              </a:ext>
+            </a:extLst>
+          </p:cNvPr>
+          <p:cNvSpPr/>
           <p:nvPr/>
-        </p:nvCxnSpPr>
+        </p:nvSpPr>
         <p:spPr>
           <a:xfrm>
-            <a:off x="6311981" y="543282"/>
-            <a:ext cx="539685" cy="0"/>
-          </a:xfrm>
-          <a:prstGeom prst="line">
-            <a:avLst/>
-          </a:prstGeom>
-        </p:spPr>
-        <p:style>
-          <a:lnRef idx="1">
-            <a:schemeClr val="dk1"/>
-          </a:lnRef>
-          <a:fillRef idx="0">
-            <a:schemeClr val="dk1"/>
-          </a:fillRef>
-          <a:effectRef idx="0">
-            <a:schemeClr val="dk1"/>
-          </a:effectRef>
-          <a:fontRef idx="minor">
-            <a:schemeClr val="tx1"/>
-          </a:fontRef>
-        </p:style>
-      </p:cxnSp>
-      <p:sp>
-        <p:nvSpPr>
-          <p:cNvPr id="26" name="Diamond 25">
-            <a:extLst>
-              <a:ext uri="{FF2B5EF4-FFF2-40B4-BE49-F238E27FC236}">
-                <a16:creationId xmlns:a16="http://schemas.microsoft.com/office/drawing/2014/main" id="{CEFA5E0B-0718-4C33-83E9-398CBD71772D}"/>
-              </a:ext>
-            </a:extLst>
-          </p:cNvPr>
-          <p:cNvSpPr/>
-          <p:nvPr/>
-        </p:nvSpPr>
-        <p:spPr>
-          <a:xfrm>
-            <a:off x="5831214" y="2764983"/>
+            <a:off x="5545730" y="3077508"/>
             <a:ext cx="480766" cy="480766"/>
           </a:xfrm>
           <a:prstGeom prst="diamond">
@@ -3894,182 +3777,21 @@
           </a:p>
         </p:txBody>
       </p:sp>
-      <p:cxnSp>
-        <p:nvCxnSpPr>
-          <p:cNvPr id="27" name="Straight Connector 26">
-            <a:extLst>
-              <a:ext uri="{FF2B5EF4-FFF2-40B4-BE49-F238E27FC236}">
-                <a16:creationId xmlns:a16="http://schemas.microsoft.com/office/drawing/2014/main" id="{A5E6814F-A860-451B-9266-310BAEA7CDAC}"/>
-              </a:ext>
-            </a:extLst>
-          </p:cNvPr>
-          <p:cNvCxnSpPr>
-            <a:cxnSpLocks/>
-            <a:stCxn id="22" idx="2"/>
-          </p:cNvCxnSpPr>
+      <p:sp>
+        <p:nvSpPr>
+          <p:cNvPr id="46" name="Diamond 45">
+            <a:extLst>
+              <a:ext uri="{FF2B5EF4-FFF2-40B4-BE49-F238E27FC236}">
+                <a16:creationId xmlns:a16="http://schemas.microsoft.com/office/drawing/2014/main" xmlns="" id="{FDB4A38F-F816-4320-82EB-071E9BA2EFAB}"/>
+              </a:ext>
+            </a:extLst>
+          </p:cNvPr>
+          <p:cNvSpPr/>
           <p:nvPr/>
-        </p:nvCxnSpPr>
-        <p:spPr>
-          <a:xfrm flipH="1">
-            <a:off x="5138342" y="2075138"/>
-            <a:ext cx="2" cy="930226"/>
-          </a:xfrm>
-          <a:prstGeom prst="line">
-            <a:avLst/>
-          </a:prstGeom>
-        </p:spPr>
-        <p:style>
-          <a:lnRef idx="1">
-            <a:schemeClr val="dk1"/>
-          </a:lnRef>
-          <a:fillRef idx="0">
-            <a:schemeClr val="dk1"/>
-          </a:fillRef>
-          <a:effectRef idx="0">
-            <a:schemeClr val="dk1"/>
-          </a:effectRef>
-          <a:fontRef idx="minor">
-            <a:schemeClr val="tx1"/>
-          </a:fontRef>
-        </p:style>
-      </p:cxnSp>
-      <p:cxnSp>
-        <p:nvCxnSpPr>
-          <p:cNvPr id="30" name="Straight Arrow Connector 29">
-            <a:extLst>
-              <a:ext uri="{FF2B5EF4-FFF2-40B4-BE49-F238E27FC236}">
-                <a16:creationId xmlns:a16="http://schemas.microsoft.com/office/drawing/2014/main" id="{75BF4C25-08E7-45D9-B119-9B95A28731D1}"/>
-              </a:ext>
-            </a:extLst>
-          </p:cNvPr>
-          <p:cNvCxnSpPr>
-            <a:cxnSpLocks/>
-            <a:endCxn id="26" idx="1"/>
-          </p:cNvCxnSpPr>
-          <p:nvPr/>
-        </p:nvCxnSpPr>
+        </p:nvSpPr>
         <p:spPr>
           <a:xfrm>
-            <a:off x="5138342" y="3005365"/>
-            <a:ext cx="692871" cy="2"/>
-          </a:xfrm>
-          <a:prstGeom prst="straightConnector1">
-            <a:avLst/>
-          </a:prstGeom>
-          <a:ln>
-            <a:tailEnd type="triangle"/>
-          </a:ln>
-        </p:spPr>
-        <p:style>
-          <a:lnRef idx="1">
-            <a:schemeClr val="dk1"/>
-          </a:lnRef>
-          <a:fillRef idx="0">
-            <a:schemeClr val="dk1"/>
-          </a:fillRef>
-          <a:effectRef idx="0">
-            <a:schemeClr val="dk1"/>
-          </a:effectRef>
-          <a:fontRef idx="minor">
-            <a:schemeClr val="tx1"/>
-          </a:fontRef>
-        </p:style>
-      </p:cxnSp>
-      <p:cxnSp>
-        <p:nvCxnSpPr>
-          <p:cNvPr id="36" name="Straight Connector 35">
-            <a:extLst>
-              <a:ext uri="{FF2B5EF4-FFF2-40B4-BE49-F238E27FC236}">
-                <a16:creationId xmlns:a16="http://schemas.microsoft.com/office/drawing/2014/main" id="{98847C5E-DAA5-4B06-82D4-86A7D99EB069}"/>
-              </a:ext>
-            </a:extLst>
-          </p:cNvPr>
-          <p:cNvCxnSpPr>
-            <a:cxnSpLocks/>
-          </p:cNvCxnSpPr>
-          <p:nvPr/>
-        </p:nvCxnSpPr>
-        <p:spPr>
-          <a:xfrm>
-            <a:off x="6851664" y="541596"/>
-            <a:ext cx="0" cy="2462082"/>
-          </a:xfrm>
-          <a:prstGeom prst="line">
-            <a:avLst/>
-          </a:prstGeom>
-        </p:spPr>
-        <p:style>
-          <a:lnRef idx="1">
-            <a:schemeClr val="dk1"/>
-          </a:lnRef>
-          <a:fillRef idx="0">
-            <a:schemeClr val="dk1"/>
-          </a:fillRef>
-          <a:effectRef idx="0">
-            <a:schemeClr val="dk1"/>
-          </a:effectRef>
-          <a:fontRef idx="minor">
-            <a:schemeClr val="tx1"/>
-          </a:fontRef>
-        </p:style>
-      </p:cxnSp>
-      <p:cxnSp>
-        <p:nvCxnSpPr>
-          <p:cNvPr id="39" name="Straight Arrow Connector 38">
-            <a:extLst>
-              <a:ext uri="{FF2B5EF4-FFF2-40B4-BE49-F238E27FC236}">
-                <a16:creationId xmlns:a16="http://schemas.microsoft.com/office/drawing/2014/main" id="{07205C61-8174-4C37-BC30-E1E54EBEAF6C}"/>
-              </a:ext>
-            </a:extLst>
-          </p:cNvPr>
-          <p:cNvCxnSpPr>
-            <a:cxnSpLocks/>
-            <a:endCxn id="26" idx="3"/>
-          </p:cNvCxnSpPr>
-          <p:nvPr/>
-        </p:nvCxnSpPr>
-        <p:spPr>
-          <a:xfrm flipH="1">
-            <a:off x="6311981" y="3003679"/>
-            <a:ext cx="539685" cy="1687"/>
-          </a:xfrm>
-          <a:prstGeom prst="straightConnector1">
-            <a:avLst/>
-          </a:prstGeom>
-          <a:ln>
-            <a:tailEnd type="triangle"/>
-          </a:ln>
-        </p:spPr>
-        <p:style>
-          <a:lnRef idx="1">
-            <a:schemeClr val="dk1"/>
-          </a:lnRef>
-          <a:fillRef idx="0">
-            <a:schemeClr val="dk1"/>
-          </a:fillRef>
-          <a:effectRef idx="0">
-            <a:schemeClr val="dk1"/>
-          </a:effectRef>
-          <a:fontRef idx="minor">
-            <a:schemeClr val="tx1"/>
-          </a:fontRef>
-        </p:style>
-      </p:cxnSp>
-      <p:sp>
-        <p:nvSpPr>
-          <p:cNvPr id="46" name="Diamond 45">
-            <a:extLst>
-              <a:ext uri="{FF2B5EF4-FFF2-40B4-BE49-F238E27FC236}">
-                <a16:creationId xmlns:a16="http://schemas.microsoft.com/office/drawing/2014/main" id="{FDB4A38F-F816-4320-82EB-071E9BA2EFAB}"/>
-              </a:ext>
-            </a:extLst>
-          </p:cNvPr>
-          <p:cNvSpPr/>
-          <p:nvPr/>
-        </p:nvSpPr>
-        <p:spPr>
-          <a:xfrm>
-            <a:off x="5874002" y="6274248"/>
+            <a:off x="9058495" y="3067868"/>
             <a:ext cx="480766" cy="480766"/>
           </a:xfrm>
           <a:prstGeom prst="diamond">
@@ -4109,7 +3831,7 @@
           <p:cNvPr id="47" name="TextBox 46">
             <a:extLst>
               <a:ext uri="{FF2B5EF4-FFF2-40B4-BE49-F238E27FC236}">
-                <a16:creationId xmlns:a16="http://schemas.microsoft.com/office/drawing/2014/main" id="{791A7435-1CBD-4D64-B373-CDF617409EFD}"/>
+                <a16:creationId xmlns:a16="http://schemas.microsoft.com/office/drawing/2014/main" xmlns="" id="{791A7435-1CBD-4D64-B373-CDF617409EFD}"/>
               </a:ext>
             </a:extLst>
           </p:cNvPr>
@@ -4118,7 +3840,7 @@
         </p:nvSpPr>
         <p:spPr>
           <a:xfrm>
-            <a:off x="6231853" y="3635003"/>
+            <a:off x="6698741" y="3423880"/>
             <a:ext cx="853127" cy="369460"/>
           </a:xfrm>
           <a:prstGeom prst="rect">
@@ -4144,7 +3866,7 @@
           <p:cNvPr id="48" name="TextBox 47">
             <a:extLst>
               <a:ext uri="{FF2B5EF4-FFF2-40B4-BE49-F238E27FC236}">
-                <a16:creationId xmlns:a16="http://schemas.microsoft.com/office/drawing/2014/main" id="{300470AD-DA4C-4F16-91F5-E3E560CDBEFC}"/>
+                <a16:creationId xmlns:a16="http://schemas.microsoft.com/office/drawing/2014/main" xmlns="" id="{300470AD-DA4C-4F16-91F5-E3E560CDBEFC}"/>
               </a:ext>
             </a:extLst>
           </p:cNvPr>
@@ -4153,7 +3875,7 @@
         </p:nvSpPr>
         <p:spPr>
           <a:xfrm>
-            <a:off x="4581755" y="3404427"/>
+            <a:off x="5959708" y="2313924"/>
             <a:ext cx="1414021" cy="646587"/>
           </a:xfrm>
           <a:prstGeom prst="rect">
@@ -4174,102 +3896,22 @@
           </a:p>
         </p:txBody>
       </p:sp>
-      <p:cxnSp>
-        <p:nvCxnSpPr>
-          <p:cNvPr id="49" name="Straight Connector 48">
-            <a:extLst>
-              <a:ext uri="{FF2B5EF4-FFF2-40B4-BE49-F238E27FC236}">
-                <a16:creationId xmlns:a16="http://schemas.microsoft.com/office/drawing/2014/main" id="{3AE9CE8A-80E1-4D09-9F84-E25B9A8DAF68}"/>
-              </a:ext>
-            </a:extLst>
-          </p:cNvPr>
-          <p:cNvCxnSpPr>
-            <a:cxnSpLocks/>
-            <a:stCxn id="56" idx="3"/>
-          </p:cNvCxnSpPr>
+      <p:sp>
+        <p:nvSpPr>
+          <p:cNvPr id="51" name="Rectangle: Rounded Corners 50">
+            <a:extLst>
+              <a:ext uri="{FF2B5EF4-FFF2-40B4-BE49-F238E27FC236}">
+                <a16:creationId xmlns:a16="http://schemas.microsoft.com/office/drawing/2014/main" xmlns="" id="{D62D81FC-C644-4602-90C8-B7974D14CA54}"/>
+              </a:ext>
+            </a:extLst>
+          </p:cNvPr>
+          <p:cNvSpPr/>
           <p:nvPr/>
-        </p:nvCxnSpPr>
+        </p:nvSpPr>
         <p:spPr>
           <a:xfrm>
-            <a:off x="6311978" y="4054768"/>
-            <a:ext cx="542446" cy="0"/>
-          </a:xfrm>
-          <a:prstGeom prst="line">
-            <a:avLst/>
-          </a:prstGeom>
-        </p:spPr>
-        <p:style>
-          <a:lnRef idx="1">
-            <a:schemeClr val="dk1"/>
-          </a:lnRef>
-          <a:fillRef idx="0">
-            <a:schemeClr val="dk1"/>
-          </a:fillRef>
-          <a:effectRef idx="0">
-            <a:schemeClr val="dk1"/>
-          </a:effectRef>
-          <a:fontRef idx="minor">
-            <a:schemeClr val="tx1"/>
-          </a:fontRef>
-        </p:style>
-      </p:cxnSp>
-      <p:cxnSp>
-        <p:nvCxnSpPr>
-          <p:cNvPr id="50" name="Straight Arrow Connector 49">
-            <a:extLst>
-              <a:ext uri="{FF2B5EF4-FFF2-40B4-BE49-F238E27FC236}">
-                <a16:creationId xmlns:a16="http://schemas.microsoft.com/office/drawing/2014/main" id="{93890486-74D2-45FF-A307-364928250438}"/>
-              </a:ext>
-            </a:extLst>
-          </p:cNvPr>
-          <p:cNvCxnSpPr>
-            <a:cxnSpLocks/>
-          </p:cNvCxnSpPr>
-          <p:nvPr/>
-        </p:nvCxnSpPr>
-        <p:spPr>
-          <a:xfrm flipH="1">
-            <a:off x="5288764" y="4056832"/>
-            <a:ext cx="1" cy="1225223"/>
-          </a:xfrm>
-          <a:prstGeom prst="straightConnector1">
-            <a:avLst/>
-          </a:prstGeom>
-          <a:ln>
-            <a:tailEnd type="triangle"/>
-          </a:ln>
-        </p:spPr>
-        <p:style>
-          <a:lnRef idx="1">
-            <a:schemeClr val="dk1"/>
-          </a:lnRef>
-          <a:fillRef idx="0">
-            <a:schemeClr val="dk1"/>
-          </a:fillRef>
-          <a:effectRef idx="0">
-            <a:schemeClr val="dk1"/>
-          </a:effectRef>
-          <a:fontRef idx="minor">
-            <a:schemeClr val="tx1"/>
-          </a:fontRef>
-        </p:style>
-      </p:cxnSp>
-      <p:sp>
-        <p:nvSpPr>
-          <p:cNvPr id="51" name="Rectangle: Rounded Corners 50">
-            <a:extLst>
-              <a:ext uri="{FF2B5EF4-FFF2-40B4-BE49-F238E27FC236}">
-                <a16:creationId xmlns:a16="http://schemas.microsoft.com/office/drawing/2014/main" id="{D62D81FC-C644-4602-90C8-B7974D14CA54}"/>
-              </a:ext>
-            </a:extLst>
-          </p:cNvPr>
-          <p:cNvSpPr/>
-          <p:nvPr/>
-        </p:nvSpPr>
-        <p:spPr>
-          <a:xfrm>
-            <a:off x="4358274" y="5282055"/>
-            <a:ext cx="1873579" cy="646330"/>
+            <a:off x="7188198" y="2606729"/>
+            <a:ext cx="1634410" cy="646330"/>
           </a:xfrm>
           <a:prstGeom prst="roundRect">
             <a:avLst/>
@@ -4306,139 +3948,21 @@
           </a:p>
         </p:txBody>
       </p:sp>
-      <p:cxnSp>
-        <p:nvCxnSpPr>
-          <p:cNvPr id="52" name="Straight Connector 51">
-            <a:extLst>
-              <a:ext uri="{FF2B5EF4-FFF2-40B4-BE49-F238E27FC236}">
-                <a16:creationId xmlns:a16="http://schemas.microsoft.com/office/drawing/2014/main" id="{4E0125F5-2933-475D-8E22-23FB92F10BB9}"/>
-              </a:ext>
-            </a:extLst>
-          </p:cNvPr>
-          <p:cNvCxnSpPr>
-            <a:cxnSpLocks/>
-            <a:endCxn id="56" idx="1"/>
-          </p:cNvCxnSpPr>
+      <p:sp>
+        <p:nvSpPr>
+          <p:cNvPr id="56" name="Diamond 55">
+            <a:extLst>
+              <a:ext uri="{FF2B5EF4-FFF2-40B4-BE49-F238E27FC236}">
+                <a16:creationId xmlns:a16="http://schemas.microsoft.com/office/drawing/2014/main" xmlns="" id="{0ACD7DC4-F31E-42B2-9D34-41B1AE997EB1}"/>
+              </a:ext>
+            </a:extLst>
+          </p:cNvPr>
+          <p:cNvSpPr/>
           <p:nvPr/>
-        </p:nvCxnSpPr>
+        </p:nvSpPr>
         <p:spPr>
           <a:xfrm>
-            <a:off x="5294728" y="4052583"/>
-            <a:ext cx="536484" cy="2185"/>
-          </a:xfrm>
-          <a:prstGeom prst="line">
-            <a:avLst/>
-          </a:prstGeom>
-        </p:spPr>
-        <p:style>
-          <a:lnRef idx="1">
-            <a:schemeClr val="dk1"/>
-          </a:lnRef>
-          <a:fillRef idx="0">
-            <a:schemeClr val="dk1"/>
-          </a:fillRef>
-          <a:effectRef idx="0">
-            <a:schemeClr val="dk1"/>
-          </a:effectRef>
-          <a:fontRef idx="minor">
-            <a:schemeClr val="tx1"/>
-          </a:fontRef>
-        </p:style>
-      </p:cxnSp>
-      <p:cxnSp>
-        <p:nvCxnSpPr>
-          <p:cNvPr id="53" name="Straight Connector 52">
-            <a:extLst>
-              <a:ext uri="{FF2B5EF4-FFF2-40B4-BE49-F238E27FC236}">
-                <a16:creationId xmlns:a16="http://schemas.microsoft.com/office/drawing/2014/main" id="{CB79C1E5-CFA9-408B-95DD-38477A84EB23}"/>
-              </a:ext>
-            </a:extLst>
-          </p:cNvPr>
-          <p:cNvCxnSpPr>
-            <a:cxnSpLocks/>
-          </p:cNvCxnSpPr>
-          <p:nvPr/>
-        </p:nvCxnSpPr>
-        <p:spPr>
-          <a:xfrm>
-            <a:off x="6851664" y="4051014"/>
-            <a:ext cx="0" cy="2462082"/>
-          </a:xfrm>
-          <a:prstGeom prst="line">
-            <a:avLst/>
-          </a:prstGeom>
-        </p:spPr>
-        <p:style>
-          <a:lnRef idx="1">
-            <a:schemeClr val="dk1"/>
-          </a:lnRef>
-          <a:fillRef idx="0">
-            <a:schemeClr val="dk1"/>
-          </a:fillRef>
-          <a:effectRef idx="0">
-            <a:schemeClr val="dk1"/>
-          </a:effectRef>
-          <a:fontRef idx="minor">
-            <a:schemeClr val="tx1"/>
-          </a:fontRef>
-        </p:style>
-      </p:cxnSp>
-      <p:cxnSp>
-        <p:nvCxnSpPr>
-          <p:cNvPr id="54" name="Straight Arrow Connector 53">
-            <a:extLst>
-              <a:ext uri="{FF2B5EF4-FFF2-40B4-BE49-F238E27FC236}">
-                <a16:creationId xmlns:a16="http://schemas.microsoft.com/office/drawing/2014/main" id="{AE0F687C-662C-4955-B0CF-562209CBC177}"/>
-              </a:ext>
-            </a:extLst>
-          </p:cNvPr>
-          <p:cNvCxnSpPr>
-            <a:cxnSpLocks/>
-          </p:cNvCxnSpPr>
-          <p:nvPr/>
-        </p:nvCxnSpPr>
-        <p:spPr>
-          <a:xfrm flipH="1">
-            <a:off x="6354768" y="6513096"/>
-            <a:ext cx="496896" cy="0"/>
-          </a:xfrm>
-          <a:prstGeom prst="straightConnector1">
-            <a:avLst/>
-          </a:prstGeom>
-          <a:ln>
-            <a:tailEnd type="triangle"/>
-          </a:ln>
-        </p:spPr>
-        <p:style>
-          <a:lnRef idx="1">
-            <a:schemeClr val="dk1"/>
-          </a:lnRef>
-          <a:fillRef idx="0">
-            <a:schemeClr val="dk1"/>
-          </a:fillRef>
-          <a:effectRef idx="0">
-            <a:schemeClr val="dk1"/>
-          </a:effectRef>
-          <a:fontRef idx="minor">
-            <a:schemeClr val="tx1"/>
-          </a:fontRef>
-        </p:style>
-      </p:cxnSp>
-      <p:sp>
-        <p:nvSpPr>
-          <p:cNvPr id="56" name="Diamond 55">
-            <a:extLst>
-              <a:ext uri="{FF2B5EF4-FFF2-40B4-BE49-F238E27FC236}">
-                <a16:creationId xmlns:a16="http://schemas.microsoft.com/office/drawing/2014/main" id="{0ACD7DC4-F31E-42B2-9D34-41B1AE997EB1}"/>
-              </a:ext>
-            </a:extLst>
-          </p:cNvPr>
-          <p:cNvSpPr/>
-          <p:nvPr/>
-        </p:nvSpPr>
-        <p:spPr>
-          <a:xfrm>
-            <a:off x="5831212" y="3814385"/>
+            <a:off x="6253122" y="3075397"/>
             <a:ext cx="480766" cy="480766"/>
           </a:xfrm>
           <a:prstGeom prst="diamond">
@@ -4475,145 +3999,24 @@
       </p:sp>
       <p:cxnSp>
         <p:nvCxnSpPr>
-          <p:cNvPr id="58" name="Straight Connector 57">
-            <a:extLst>
-              <a:ext uri="{FF2B5EF4-FFF2-40B4-BE49-F238E27FC236}">
-                <a16:creationId xmlns:a16="http://schemas.microsoft.com/office/drawing/2014/main" id="{1321E06C-BD3F-48BC-B492-E9A960F6A4C8}"/>
+          <p:cNvPr id="69" name="Straight Arrow Connector 68">
+            <a:extLst>
+              <a:ext uri="{FF2B5EF4-FFF2-40B4-BE49-F238E27FC236}">
+                <a16:creationId xmlns:a16="http://schemas.microsoft.com/office/drawing/2014/main" xmlns="" id="{7BE2639B-14BA-4C9C-9964-899CEF3278C9}"/>
               </a:ext>
             </a:extLst>
           </p:cNvPr>
           <p:cNvCxnSpPr>
             <a:cxnSpLocks/>
+            <a:stCxn id="46" idx="3"/>
+            <a:endCxn id="68" idx="2"/>
           </p:cNvCxnSpPr>
           <p:nvPr/>
         </p:nvCxnSpPr>
         <p:spPr>
           <a:xfrm>
-            <a:off x="5288764" y="5928385"/>
-            <a:ext cx="0" cy="584711"/>
-          </a:xfrm>
-          <a:prstGeom prst="line">
-            <a:avLst/>
-          </a:prstGeom>
-        </p:spPr>
-        <p:style>
-          <a:lnRef idx="1">
-            <a:schemeClr val="dk1"/>
-          </a:lnRef>
-          <a:fillRef idx="0">
-            <a:schemeClr val="dk1"/>
-          </a:fillRef>
-          <a:effectRef idx="0">
-            <a:schemeClr val="dk1"/>
-          </a:effectRef>
-          <a:fontRef idx="minor">
-            <a:schemeClr val="tx1"/>
-          </a:fontRef>
-        </p:style>
-      </p:cxnSp>
-      <p:cxnSp>
-        <p:nvCxnSpPr>
-          <p:cNvPr id="59" name="Straight Arrow Connector 58">
-            <a:extLst>
-              <a:ext uri="{FF2B5EF4-FFF2-40B4-BE49-F238E27FC236}">
-                <a16:creationId xmlns:a16="http://schemas.microsoft.com/office/drawing/2014/main" id="{CD1E2DBC-0139-4003-ADA5-A30804607F85}"/>
-              </a:ext>
-            </a:extLst>
-          </p:cNvPr>
-          <p:cNvCxnSpPr>
-            <a:cxnSpLocks/>
-          </p:cNvCxnSpPr>
-          <p:nvPr/>
-        </p:nvCxnSpPr>
-        <p:spPr>
-          <a:xfrm>
-            <a:off x="5288764" y="6513129"/>
-            <a:ext cx="614040" cy="0"/>
-          </a:xfrm>
-          <a:prstGeom prst="straightConnector1">
-            <a:avLst/>
-          </a:prstGeom>
-          <a:ln>
-            <a:tailEnd type="triangle"/>
-          </a:ln>
-        </p:spPr>
-        <p:style>
-          <a:lnRef idx="1">
-            <a:schemeClr val="dk1"/>
-          </a:lnRef>
-          <a:fillRef idx="0">
-            <a:schemeClr val="dk1"/>
-          </a:fillRef>
-          <a:effectRef idx="0">
-            <a:schemeClr val="dk1"/>
-          </a:effectRef>
-          <a:fontRef idx="minor">
-            <a:schemeClr val="tx1"/>
-          </a:fontRef>
-        </p:style>
-      </p:cxnSp>
-      <p:cxnSp>
-        <p:nvCxnSpPr>
-          <p:cNvPr id="65" name="Straight Arrow Connector 64">
-            <a:extLst>
-              <a:ext uri="{FF2B5EF4-FFF2-40B4-BE49-F238E27FC236}">
-                <a16:creationId xmlns:a16="http://schemas.microsoft.com/office/drawing/2014/main" id="{F19B7A29-4E76-4FF6-AB20-F964D8CE510E}"/>
-              </a:ext>
-            </a:extLst>
-          </p:cNvPr>
-          <p:cNvCxnSpPr>
-            <a:cxnSpLocks/>
-            <a:stCxn id="26" idx="2"/>
-            <a:endCxn id="56" idx="0"/>
-          </p:cNvCxnSpPr>
-          <p:nvPr/>
-        </p:nvCxnSpPr>
-        <p:spPr>
-          <a:xfrm flipH="1">
-            <a:off x="6071595" y="3245749"/>
-            <a:ext cx="2" cy="568636"/>
-          </a:xfrm>
-          <a:prstGeom prst="straightConnector1">
-            <a:avLst/>
-          </a:prstGeom>
-          <a:ln>
-            <a:tailEnd type="triangle"/>
-          </a:ln>
-        </p:spPr>
-        <p:style>
-          <a:lnRef idx="1">
-            <a:schemeClr val="dk1"/>
-          </a:lnRef>
-          <a:fillRef idx="0">
-            <a:schemeClr val="dk1"/>
-          </a:fillRef>
-          <a:effectRef idx="0">
-            <a:schemeClr val="dk1"/>
-          </a:effectRef>
-          <a:fontRef idx="minor">
-            <a:schemeClr val="tx1"/>
-          </a:fontRef>
-        </p:style>
-      </p:cxnSp>
-      <p:cxnSp>
-        <p:nvCxnSpPr>
-          <p:cNvPr id="69" name="Straight Arrow Connector 68">
-            <a:extLst>
-              <a:ext uri="{FF2B5EF4-FFF2-40B4-BE49-F238E27FC236}">
-                <a16:creationId xmlns:a16="http://schemas.microsoft.com/office/drawing/2014/main" id="{7BE2639B-14BA-4C9C-9964-899CEF3278C9}"/>
-              </a:ext>
-            </a:extLst>
-          </p:cNvPr>
-          <p:cNvCxnSpPr>
-            <a:cxnSpLocks/>
-            <a:stCxn id="46" idx="2"/>
-          </p:cNvCxnSpPr>
-          <p:nvPr/>
-        </p:nvCxnSpPr>
-        <p:spPr>
-          <a:xfrm>
-            <a:off x="6114385" y="6755014"/>
-            <a:ext cx="0" cy="747054"/>
+            <a:off x="9539261" y="3308251"/>
+            <a:ext cx="419377" cy="7529"/>
           </a:xfrm>
           <a:prstGeom prst="straightConnector1">
             <a:avLst/>
@@ -4642,7 +4045,7 @@
           <p:cNvPr id="75" name="Group 74">
             <a:extLst>
               <a:ext uri="{FF2B5EF4-FFF2-40B4-BE49-F238E27FC236}">
-                <a16:creationId xmlns:a16="http://schemas.microsoft.com/office/drawing/2014/main" id="{A48F4168-7D41-4ED6-97F1-58289DDE3C4D}"/>
+                <a16:creationId xmlns:a16="http://schemas.microsoft.com/office/drawing/2014/main" xmlns="" id="{A48F4168-7D41-4ED6-97F1-58289DDE3C4D}"/>
               </a:ext>
             </a:extLst>
           </p:cNvPr>
@@ -4651,7 +4054,7 @@
         </p:nvGrpSpPr>
         <p:grpSpPr>
           <a:xfrm>
-            <a:off x="5996550" y="7502068"/>
+            <a:off x="9958638" y="3197945"/>
             <a:ext cx="235669" cy="235669"/>
             <a:chOff x="8040730" y="5082186"/>
             <a:chExt cx="235669" cy="235669"/>
@@ -4662,7 +4065,7 @@
             <p:cNvPr id="68" name="Oval 67">
               <a:extLst>
                 <a:ext uri="{FF2B5EF4-FFF2-40B4-BE49-F238E27FC236}">
-                  <a16:creationId xmlns:a16="http://schemas.microsoft.com/office/drawing/2014/main" id="{E423C8D7-553D-4A16-BA68-78DB113CAEC3}"/>
+                  <a16:creationId xmlns:a16="http://schemas.microsoft.com/office/drawing/2014/main" xmlns="" id="{E423C8D7-553D-4A16-BA68-78DB113CAEC3}"/>
                 </a:ext>
               </a:extLst>
             </p:cNvPr>
@@ -4714,7 +4117,7 @@
             <p:cNvPr id="71" name="Oval 70">
               <a:extLst>
                 <a:ext uri="{FF2B5EF4-FFF2-40B4-BE49-F238E27FC236}">
-                  <a16:creationId xmlns:a16="http://schemas.microsoft.com/office/drawing/2014/main" id="{1F41AA13-1BFC-498E-BBC4-DC32053E38E1}"/>
+                  <a16:creationId xmlns:a16="http://schemas.microsoft.com/office/drawing/2014/main" xmlns="" id="{1F41AA13-1BFC-498E-BBC4-DC32053E38E1}"/>
                 </a:ext>
               </a:extLst>
             </p:cNvPr>
@@ -4759,6 +4162,264 @@
           </p:txBody>
         </p:sp>
       </p:grpSp>
+      <p:cxnSp>
+        <p:nvCxnSpPr>
+          <p:cNvPr id="24" name="Elbow Connector 23"/>
+          <p:cNvCxnSpPr>
+            <a:stCxn id="12" idx="2"/>
+            <a:endCxn id="22" idx="1"/>
+          </p:cNvCxnSpPr>
+          <p:nvPr/>
+        </p:nvCxnSpPr>
+        <p:spPr>
+          <a:xfrm rot="16200000" flipH="1">
+            <a:off x="3849008" y="3492962"/>
+            <a:ext cx="197518" cy="328141"/>
+          </a:xfrm>
+          <a:prstGeom prst="bentConnector2">
+            <a:avLst/>
+          </a:prstGeom>
+          <a:ln>
+            <a:tailEnd type="triangle"/>
+          </a:ln>
+        </p:spPr>
+        <p:style>
+          <a:lnRef idx="1">
+            <a:schemeClr val="dk1"/>
+          </a:lnRef>
+          <a:fillRef idx="0">
+            <a:schemeClr val="dk1"/>
+          </a:fillRef>
+          <a:effectRef idx="0">
+            <a:schemeClr val="dk1"/>
+          </a:effectRef>
+          <a:fontRef idx="minor">
+            <a:schemeClr val="tx1"/>
+          </a:fontRef>
+        </p:style>
+      </p:cxnSp>
+      <p:cxnSp>
+        <p:nvCxnSpPr>
+          <p:cNvPr id="55" name="Elbow Connector 54"/>
+          <p:cNvCxnSpPr>
+            <a:stCxn id="12" idx="0"/>
+            <a:endCxn id="26" idx="0"/>
+          </p:cNvCxnSpPr>
+          <p:nvPr/>
+        </p:nvCxnSpPr>
+        <p:spPr>
+          <a:xfrm rot="5400000" flipH="1" flipV="1">
+            <a:off x="4784905" y="2076300"/>
+            <a:ext cx="12700" cy="2002416"/>
+          </a:xfrm>
+          <a:prstGeom prst="bentConnector3">
+            <a:avLst>
+              <a:gd name="adj1" fmla="val 1800000"/>
+            </a:avLst>
+          </a:prstGeom>
+          <a:ln>
+            <a:tailEnd type="triangle"/>
+          </a:ln>
+        </p:spPr>
+        <p:style>
+          <a:lnRef idx="1">
+            <a:schemeClr val="dk1"/>
+          </a:lnRef>
+          <a:fillRef idx="0">
+            <a:schemeClr val="dk1"/>
+          </a:fillRef>
+          <a:effectRef idx="0">
+            <a:schemeClr val="dk1"/>
+          </a:effectRef>
+          <a:fontRef idx="minor">
+            <a:schemeClr val="tx1"/>
+          </a:fontRef>
+        </p:style>
+      </p:cxnSp>
+      <p:cxnSp>
+        <p:nvCxnSpPr>
+          <p:cNvPr id="57" name="Elbow Connector 56"/>
+          <p:cNvCxnSpPr>
+            <a:stCxn id="22" idx="3"/>
+            <a:endCxn id="26" idx="2"/>
+          </p:cNvCxnSpPr>
+          <p:nvPr/>
+        </p:nvCxnSpPr>
+        <p:spPr>
+          <a:xfrm flipV="1">
+            <a:off x="5457972" y="3558274"/>
+            <a:ext cx="328141" cy="197518"/>
+          </a:xfrm>
+          <a:prstGeom prst="bentConnector2">
+            <a:avLst/>
+          </a:prstGeom>
+          <a:ln>
+            <a:tailEnd type="triangle"/>
+          </a:ln>
+        </p:spPr>
+        <p:style>
+          <a:lnRef idx="1">
+            <a:schemeClr val="dk1"/>
+          </a:lnRef>
+          <a:fillRef idx="0">
+            <a:schemeClr val="dk1"/>
+          </a:fillRef>
+          <a:effectRef idx="0">
+            <a:schemeClr val="dk1"/>
+          </a:effectRef>
+          <a:fontRef idx="minor">
+            <a:schemeClr val="tx1"/>
+          </a:fontRef>
+        </p:style>
+      </p:cxnSp>
+      <p:cxnSp>
+        <p:nvCxnSpPr>
+          <p:cNvPr id="61" name="Elbow Connector 60"/>
+          <p:cNvCxnSpPr>
+            <a:stCxn id="26" idx="3"/>
+            <a:endCxn id="56" idx="1"/>
+          </p:cNvCxnSpPr>
+          <p:nvPr/>
+        </p:nvCxnSpPr>
+        <p:spPr>
+          <a:xfrm flipV="1">
+            <a:off x="6026496" y="3315780"/>
+            <a:ext cx="226626" cy="2111"/>
+          </a:xfrm>
+          <a:prstGeom prst="bentConnector3">
+            <a:avLst>
+              <a:gd name="adj1" fmla="val 50000"/>
+            </a:avLst>
+          </a:prstGeom>
+          <a:ln>
+            <a:tailEnd type="triangle"/>
+          </a:ln>
+        </p:spPr>
+        <p:style>
+          <a:lnRef idx="1">
+            <a:schemeClr val="dk1"/>
+          </a:lnRef>
+          <a:fillRef idx="0">
+            <a:schemeClr val="dk1"/>
+          </a:fillRef>
+          <a:effectRef idx="0">
+            <a:schemeClr val="dk1"/>
+          </a:effectRef>
+          <a:fontRef idx="minor">
+            <a:schemeClr val="tx1"/>
+          </a:fontRef>
+        </p:style>
+      </p:cxnSp>
+      <p:cxnSp>
+        <p:nvCxnSpPr>
+          <p:cNvPr id="66" name="Elbow Connector 65"/>
+          <p:cNvCxnSpPr>
+            <a:stCxn id="56" idx="0"/>
+            <a:endCxn id="51" idx="1"/>
+          </p:cNvCxnSpPr>
+          <p:nvPr/>
+        </p:nvCxnSpPr>
+        <p:spPr>
+          <a:xfrm rot="5400000" flipH="1" flipV="1">
+            <a:off x="6768100" y="2655300"/>
+            <a:ext cx="145503" cy="694693"/>
+          </a:xfrm>
+          <a:prstGeom prst="bentConnector2">
+            <a:avLst/>
+          </a:prstGeom>
+          <a:ln>
+            <a:tailEnd type="triangle"/>
+          </a:ln>
+        </p:spPr>
+        <p:style>
+          <a:lnRef idx="1">
+            <a:schemeClr val="dk1"/>
+          </a:lnRef>
+          <a:fillRef idx="0">
+            <a:schemeClr val="dk1"/>
+          </a:fillRef>
+          <a:effectRef idx="0">
+            <a:schemeClr val="dk1"/>
+          </a:effectRef>
+          <a:fontRef idx="minor">
+            <a:schemeClr val="tx1"/>
+          </a:fontRef>
+        </p:style>
+      </p:cxnSp>
+      <p:cxnSp>
+        <p:nvCxnSpPr>
+          <p:cNvPr id="72" name="Elbow Connector 71"/>
+          <p:cNvCxnSpPr>
+            <a:stCxn id="56" idx="2"/>
+            <a:endCxn id="46" idx="2"/>
+          </p:cNvCxnSpPr>
+          <p:nvPr/>
+        </p:nvCxnSpPr>
+        <p:spPr>
+          <a:xfrm rot="5400000" flipH="1" flipV="1">
+            <a:off x="7892426" y="2149712"/>
+            <a:ext cx="7529" cy="2805373"/>
+          </a:xfrm>
+          <a:prstGeom prst="bentConnector3">
+            <a:avLst>
+              <a:gd name="adj1" fmla="val -3036260"/>
+            </a:avLst>
+          </a:prstGeom>
+          <a:ln>
+            <a:tailEnd type="triangle"/>
+          </a:ln>
+        </p:spPr>
+        <p:style>
+          <a:lnRef idx="1">
+            <a:schemeClr val="dk1"/>
+          </a:lnRef>
+          <a:fillRef idx="0">
+            <a:schemeClr val="dk1"/>
+          </a:fillRef>
+          <a:effectRef idx="0">
+            <a:schemeClr val="dk1"/>
+          </a:effectRef>
+          <a:fontRef idx="minor">
+            <a:schemeClr val="tx1"/>
+          </a:fontRef>
+        </p:style>
+      </p:cxnSp>
+      <p:cxnSp>
+        <p:nvCxnSpPr>
+          <p:cNvPr id="74" name="Elbow Connector 73"/>
+          <p:cNvCxnSpPr>
+            <a:stCxn id="51" idx="3"/>
+            <a:endCxn id="46" idx="0"/>
+          </p:cNvCxnSpPr>
+          <p:nvPr/>
+        </p:nvCxnSpPr>
+        <p:spPr>
+          <a:xfrm>
+            <a:off x="8822608" y="2929894"/>
+            <a:ext cx="476270" cy="137974"/>
+          </a:xfrm>
+          <a:prstGeom prst="bentConnector2">
+            <a:avLst/>
+          </a:prstGeom>
+          <a:ln>
+            <a:tailEnd type="triangle"/>
+          </a:ln>
+        </p:spPr>
+        <p:style>
+          <a:lnRef idx="1">
+            <a:schemeClr val="dk1"/>
+          </a:lnRef>
+          <a:fillRef idx="0">
+            <a:schemeClr val="dk1"/>
+          </a:fillRef>
+          <a:effectRef idx="0">
+            <a:schemeClr val="dk1"/>
+          </a:effectRef>
+          <a:fontRef idx="minor">
+            <a:schemeClr val="tx1"/>
+          </a:fontRef>
+        </p:style>
+      </p:cxnSp>
     </p:spTree>
     <p:extLst>
       <p:ext uri="{BB962C8B-B14F-4D97-AF65-F5344CB8AC3E}">

</xml_diff>